<commit_message>
added bad goal and good goal policy
</commit_message>
<xml_diff>
--- a/Figures.pptx
+++ b/Figures.pptx
@@ -4,9 +4,14 @@
   <p:sldMasterIdLst>
     <p:sldMasterId id="2147483648" r:id="rId1"/>
   </p:sldMasterIdLst>
+  <p:notesMasterIdLst>
+    <p:notesMasterId r:id="rId6"/>
+  </p:notesMasterIdLst>
   <p:sldIdLst>
     <p:sldId id="256" r:id="rId2"/>
     <p:sldId id="257" r:id="rId3"/>
+    <p:sldId id="258" r:id="rId4"/>
+    <p:sldId id="259" r:id="rId5"/>
   </p:sldIdLst>
   <p:sldSz cx="12192000" cy="6858000"/>
   <p:notesSz cx="6858000" cy="9144000"/>
@@ -113,8 +118,437 @@
 </p:presentation>
 </file>
 
-<file path=ppt/revisionInfo.xml><?xml version="1.0" encoding="utf-8"?>
-<p1510:revInfo xmlns:a="http://schemas.openxmlformats.org/drawingml/2006/main" xmlns:r="http://schemas.openxmlformats.org/officeDocument/2006/relationships" xmlns:p1510="http://schemas.microsoft.com/office/powerpoint/2015/10/main"/>
+<file path=ppt/notesMasters/notesMaster1.xml><?xml version="1.0" encoding="utf-8"?>
+<p:notesMaster xmlns:a="http://schemas.openxmlformats.org/drawingml/2006/main" xmlns:r="http://schemas.openxmlformats.org/officeDocument/2006/relationships" xmlns:p="http://schemas.openxmlformats.org/presentationml/2006/main">
+  <p:cSld>
+    <p:bg>
+      <p:bgRef idx="1001">
+        <a:schemeClr val="bg1"/>
+      </p:bgRef>
+    </p:bg>
+    <p:spTree>
+      <p:nvGrpSpPr>
+        <p:cNvPr id="1" name=""/>
+        <p:cNvGrpSpPr/>
+        <p:nvPr/>
+      </p:nvGrpSpPr>
+      <p:grpSpPr>
+        <a:xfrm>
+          <a:off x="0" y="0"/>
+          <a:ext cx="0" cy="0"/>
+          <a:chOff x="0" y="0"/>
+          <a:chExt cx="0" cy="0"/>
+        </a:xfrm>
+      </p:grpSpPr>
+      <p:sp>
+        <p:nvSpPr>
+          <p:cNvPr id="2" name="Header Placeholder 1"/>
+          <p:cNvSpPr>
+            <a:spLocks noGrp="1"/>
+          </p:cNvSpPr>
+          <p:nvPr>
+            <p:ph type="hdr" sz="quarter"/>
+          </p:nvPr>
+        </p:nvSpPr>
+        <p:spPr>
+          <a:xfrm>
+            <a:off x="0" y="0"/>
+            <a:ext cx="2971800" cy="458788"/>
+          </a:xfrm>
+          <a:prstGeom prst="rect">
+            <a:avLst/>
+          </a:prstGeom>
+        </p:spPr>
+        <p:txBody>
+          <a:bodyPr vert="horz" lIns="91440" tIns="45720" rIns="91440" bIns="45720" rtlCol="0"/>
+          <a:lstStyle>
+            <a:lvl1pPr algn="l">
+              <a:defRPr sz="1200"/>
+            </a:lvl1pPr>
+          </a:lstStyle>
+          <a:p>
+            <a:endParaRPr lang="en-US"/>
+          </a:p>
+        </p:txBody>
+      </p:sp>
+      <p:sp>
+        <p:nvSpPr>
+          <p:cNvPr id="3" name="Date Placeholder 2"/>
+          <p:cNvSpPr>
+            <a:spLocks noGrp="1"/>
+          </p:cNvSpPr>
+          <p:nvPr>
+            <p:ph type="dt" idx="1"/>
+          </p:nvPr>
+        </p:nvSpPr>
+        <p:spPr>
+          <a:xfrm>
+            <a:off x="3884613" y="0"/>
+            <a:ext cx="2971800" cy="458788"/>
+          </a:xfrm>
+          <a:prstGeom prst="rect">
+            <a:avLst/>
+          </a:prstGeom>
+        </p:spPr>
+        <p:txBody>
+          <a:bodyPr vert="horz" lIns="91440" tIns="45720" rIns="91440" bIns="45720" rtlCol="0"/>
+          <a:lstStyle>
+            <a:lvl1pPr algn="r">
+              <a:defRPr sz="1200"/>
+            </a:lvl1pPr>
+          </a:lstStyle>
+          <a:p>
+            <a:fld id="{3ADF0D95-0ECF-473B-951A-4497ACAAD43C}" type="datetimeFigureOut">
+              <a:rPr lang="en-US" smtClean="0"/>
+              <a:t>9/20/2017</a:t>
+            </a:fld>
+            <a:endParaRPr lang="en-US"/>
+          </a:p>
+        </p:txBody>
+      </p:sp>
+      <p:sp>
+        <p:nvSpPr>
+          <p:cNvPr id="4" name="Slide Image Placeholder 3"/>
+          <p:cNvSpPr>
+            <a:spLocks noGrp="1" noRot="1" noChangeAspect="1"/>
+          </p:cNvSpPr>
+          <p:nvPr>
+            <p:ph type="sldImg" idx="2"/>
+          </p:nvPr>
+        </p:nvSpPr>
+        <p:spPr>
+          <a:xfrm>
+            <a:off x="685800" y="1143000"/>
+            <a:ext cx="5486400" cy="3086100"/>
+          </a:xfrm>
+          <a:prstGeom prst="rect">
+            <a:avLst/>
+          </a:prstGeom>
+          <a:noFill/>
+          <a:ln w="12700">
+            <a:solidFill>
+              <a:prstClr val="black"/>
+            </a:solidFill>
+          </a:ln>
+        </p:spPr>
+        <p:txBody>
+          <a:bodyPr vert="horz" lIns="91440" tIns="45720" rIns="91440" bIns="45720" rtlCol="0" anchor="ctr"/>
+          <a:lstStyle/>
+          <a:p>
+            <a:endParaRPr lang="en-US"/>
+          </a:p>
+        </p:txBody>
+      </p:sp>
+      <p:sp>
+        <p:nvSpPr>
+          <p:cNvPr id="5" name="Notes Placeholder 4"/>
+          <p:cNvSpPr>
+            <a:spLocks noGrp="1"/>
+          </p:cNvSpPr>
+          <p:nvPr>
+            <p:ph type="body" sz="quarter" idx="3"/>
+          </p:nvPr>
+        </p:nvSpPr>
+        <p:spPr>
+          <a:xfrm>
+            <a:off x="685800" y="4400550"/>
+            <a:ext cx="5486400" cy="3600450"/>
+          </a:xfrm>
+          <a:prstGeom prst="rect">
+            <a:avLst/>
+          </a:prstGeom>
+        </p:spPr>
+        <p:txBody>
+          <a:bodyPr vert="horz" lIns="91440" tIns="45720" rIns="91440" bIns="45720" rtlCol="0"/>
+          <a:lstStyle/>
+          <a:p>
+            <a:pPr lvl="0"/>
+            <a:r>
+              <a:rPr lang="en-US"/>
+              <a:t>Edit Master text styles</a:t>
+            </a:r>
+          </a:p>
+          <a:p>
+            <a:pPr lvl="1"/>
+            <a:r>
+              <a:rPr lang="en-US"/>
+              <a:t>Second level</a:t>
+            </a:r>
+          </a:p>
+          <a:p>
+            <a:pPr lvl="2"/>
+            <a:r>
+              <a:rPr lang="en-US"/>
+              <a:t>Third level</a:t>
+            </a:r>
+          </a:p>
+          <a:p>
+            <a:pPr lvl="3"/>
+            <a:r>
+              <a:rPr lang="en-US"/>
+              <a:t>Fourth level</a:t>
+            </a:r>
+          </a:p>
+          <a:p>
+            <a:pPr lvl="4"/>
+            <a:r>
+              <a:rPr lang="en-US"/>
+              <a:t>Fifth level</a:t>
+            </a:r>
+          </a:p>
+        </p:txBody>
+      </p:sp>
+      <p:sp>
+        <p:nvSpPr>
+          <p:cNvPr id="6" name="Footer Placeholder 5"/>
+          <p:cNvSpPr>
+            <a:spLocks noGrp="1"/>
+          </p:cNvSpPr>
+          <p:nvPr>
+            <p:ph type="ftr" sz="quarter" idx="4"/>
+          </p:nvPr>
+        </p:nvSpPr>
+        <p:spPr>
+          <a:xfrm>
+            <a:off x="0" y="8685213"/>
+            <a:ext cx="2971800" cy="458787"/>
+          </a:xfrm>
+          <a:prstGeom prst="rect">
+            <a:avLst/>
+          </a:prstGeom>
+        </p:spPr>
+        <p:txBody>
+          <a:bodyPr vert="horz" lIns="91440" tIns="45720" rIns="91440" bIns="45720" rtlCol="0" anchor="b"/>
+          <a:lstStyle>
+            <a:lvl1pPr algn="l">
+              <a:defRPr sz="1200"/>
+            </a:lvl1pPr>
+          </a:lstStyle>
+          <a:p>
+            <a:endParaRPr lang="en-US"/>
+          </a:p>
+        </p:txBody>
+      </p:sp>
+      <p:sp>
+        <p:nvSpPr>
+          <p:cNvPr id="7" name="Slide Number Placeholder 6"/>
+          <p:cNvSpPr>
+            <a:spLocks noGrp="1"/>
+          </p:cNvSpPr>
+          <p:nvPr>
+            <p:ph type="sldNum" sz="quarter" idx="5"/>
+          </p:nvPr>
+        </p:nvSpPr>
+        <p:spPr>
+          <a:xfrm>
+            <a:off x="3884613" y="8685213"/>
+            <a:ext cx="2971800" cy="458787"/>
+          </a:xfrm>
+          <a:prstGeom prst="rect">
+            <a:avLst/>
+          </a:prstGeom>
+        </p:spPr>
+        <p:txBody>
+          <a:bodyPr vert="horz" lIns="91440" tIns="45720" rIns="91440" bIns="45720" rtlCol="0" anchor="b"/>
+          <a:lstStyle>
+            <a:lvl1pPr algn="r">
+              <a:defRPr sz="1200"/>
+            </a:lvl1pPr>
+          </a:lstStyle>
+          <a:p>
+            <a:fld id="{7EA3D747-5010-4123-83E3-616627F571BA}" type="slidenum">
+              <a:rPr lang="en-US" smtClean="0"/>
+              <a:t>‹#›</a:t>
+            </a:fld>
+            <a:endParaRPr lang="en-US"/>
+          </a:p>
+        </p:txBody>
+      </p:sp>
+    </p:spTree>
+    <p:extLst>
+      <p:ext uri="{BB962C8B-B14F-4D97-AF65-F5344CB8AC3E}">
+        <p14:creationId xmlns:p14="http://schemas.microsoft.com/office/powerpoint/2010/main" val="10880547"/>
+      </p:ext>
+    </p:extLst>
+  </p:cSld>
+  <p:clrMap bg1="lt1" tx1="dk1" bg2="lt2" tx2="dk2" accent1="accent1" accent2="accent2" accent3="accent3" accent4="accent4" accent5="accent5" accent6="accent6" hlink="hlink" folHlink="folHlink"/>
+  <p:notesStyle>
+    <a:lvl1pPr marL="0" algn="l" defTabSz="914400" rtl="0" eaLnBrk="1" latinLnBrk="0" hangingPunct="1">
+      <a:defRPr sz="1200" kern="1200">
+        <a:solidFill>
+          <a:schemeClr val="tx1"/>
+        </a:solidFill>
+        <a:latin typeface="+mn-lt"/>
+        <a:ea typeface="+mn-ea"/>
+        <a:cs typeface="+mn-cs"/>
+      </a:defRPr>
+    </a:lvl1pPr>
+    <a:lvl2pPr marL="457200" algn="l" defTabSz="914400" rtl="0" eaLnBrk="1" latinLnBrk="0" hangingPunct="1">
+      <a:defRPr sz="1200" kern="1200">
+        <a:solidFill>
+          <a:schemeClr val="tx1"/>
+        </a:solidFill>
+        <a:latin typeface="+mn-lt"/>
+        <a:ea typeface="+mn-ea"/>
+        <a:cs typeface="+mn-cs"/>
+      </a:defRPr>
+    </a:lvl2pPr>
+    <a:lvl3pPr marL="914400" algn="l" defTabSz="914400" rtl="0" eaLnBrk="1" latinLnBrk="0" hangingPunct="1">
+      <a:defRPr sz="1200" kern="1200">
+        <a:solidFill>
+          <a:schemeClr val="tx1"/>
+        </a:solidFill>
+        <a:latin typeface="+mn-lt"/>
+        <a:ea typeface="+mn-ea"/>
+        <a:cs typeface="+mn-cs"/>
+      </a:defRPr>
+    </a:lvl3pPr>
+    <a:lvl4pPr marL="1371600" algn="l" defTabSz="914400" rtl="0" eaLnBrk="1" latinLnBrk="0" hangingPunct="1">
+      <a:defRPr sz="1200" kern="1200">
+        <a:solidFill>
+          <a:schemeClr val="tx1"/>
+        </a:solidFill>
+        <a:latin typeface="+mn-lt"/>
+        <a:ea typeface="+mn-ea"/>
+        <a:cs typeface="+mn-cs"/>
+      </a:defRPr>
+    </a:lvl4pPr>
+    <a:lvl5pPr marL="1828800" algn="l" defTabSz="914400" rtl="0" eaLnBrk="1" latinLnBrk="0" hangingPunct="1">
+      <a:defRPr sz="1200" kern="1200">
+        <a:solidFill>
+          <a:schemeClr val="tx1"/>
+        </a:solidFill>
+        <a:latin typeface="+mn-lt"/>
+        <a:ea typeface="+mn-ea"/>
+        <a:cs typeface="+mn-cs"/>
+      </a:defRPr>
+    </a:lvl5pPr>
+    <a:lvl6pPr marL="2286000" algn="l" defTabSz="914400" rtl="0" eaLnBrk="1" latinLnBrk="0" hangingPunct="1">
+      <a:defRPr sz="1200" kern="1200">
+        <a:solidFill>
+          <a:schemeClr val="tx1"/>
+        </a:solidFill>
+        <a:latin typeface="+mn-lt"/>
+        <a:ea typeface="+mn-ea"/>
+        <a:cs typeface="+mn-cs"/>
+      </a:defRPr>
+    </a:lvl6pPr>
+    <a:lvl7pPr marL="2743200" algn="l" defTabSz="914400" rtl="0" eaLnBrk="1" latinLnBrk="0" hangingPunct="1">
+      <a:defRPr sz="1200" kern="1200">
+        <a:solidFill>
+          <a:schemeClr val="tx1"/>
+        </a:solidFill>
+        <a:latin typeface="+mn-lt"/>
+        <a:ea typeface="+mn-ea"/>
+        <a:cs typeface="+mn-cs"/>
+      </a:defRPr>
+    </a:lvl7pPr>
+    <a:lvl8pPr marL="3200400" algn="l" defTabSz="914400" rtl="0" eaLnBrk="1" latinLnBrk="0" hangingPunct="1">
+      <a:defRPr sz="1200" kern="1200">
+        <a:solidFill>
+          <a:schemeClr val="tx1"/>
+        </a:solidFill>
+        <a:latin typeface="+mn-lt"/>
+        <a:ea typeface="+mn-ea"/>
+        <a:cs typeface="+mn-cs"/>
+      </a:defRPr>
+    </a:lvl8pPr>
+    <a:lvl9pPr marL="3657600" algn="l" defTabSz="914400" rtl="0" eaLnBrk="1" latinLnBrk="0" hangingPunct="1">
+      <a:defRPr sz="1200" kern="1200">
+        <a:solidFill>
+          <a:schemeClr val="tx1"/>
+        </a:solidFill>
+        <a:latin typeface="+mn-lt"/>
+        <a:ea typeface="+mn-ea"/>
+        <a:cs typeface="+mn-cs"/>
+      </a:defRPr>
+    </a:lvl9pPr>
+  </p:notesStyle>
+</p:notesMaster>
+</file>
+
+<file path=ppt/notesSlides/notesSlide1.xml><?xml version="1.0" encoding="utf-8"?>
+<p:notes xmlns:a="http://schemas.openxmlformats.org/drawingml/2006/main" xmlns:r="http://schemas.openxmlformats.org/officeDocument/2006/relationships" xmlns:p="http://schemas.openxmlformats.org/presentationml/2006/main">
+  <p:cSld>
+    <p:spTree>
+      <p:nvGrpSpPr>
+        <p:cNvPr id="1" name=""/>
+        <p:cNvGrpSpPr/>
+        <p:nvPr/>
+      </p:nvGrpSpPr>
+      <p:grpSpPr>
+        <a:xfrm>
+          <a:off x="0" y="0"/>
+          <a:ext cx="0" cy="0"/>
+          <a:chOff x="0" y="0"/>
+          <a:chExt cx="0" cy="0"/>
+        </a:xfrm>
+      </p:grpSpPr>
+      <p:sp>
+        <p:nvSpPr>
+          <p:cNvPr id="2" name="Slide Image Placeholder 1"/>
+          <p:cNvSpPr>
+            <a:spLocks noGrp="1" noRot="1" noChangeAspect="1"/>
+          </p:cNvSpPr>
+          <p:nvPr>
+            <p:ph type="sldImg"/>
+          </p:nvPr>
+        </p:nvSpPr>
+        <p:spPr/>
+      </p:sp>
+      <p:sp>
+        <p:nvSpPr>
+          <p:cNvPr id="3" name="Notes Placeholder 2"/>
+          <p:cNvSpPr>
+            <a:spLocks noGrp="1"/>
+          </p:cNvSpPr>
+          <p:nvPr>
+            <p:ph type="body" idx="1"/>
+          </p:nvPr>
+        </p:nvSpPr>
+        <p:spPr/>
+        <p:txBody>
+          <a:bodyPr/>
+          <a:lstStyle/>
+          <a:p>
+            <a:endParaRPr lang="en-US" dirty="0"/>
+          </a:p>
+        </p:txBody>
+      </p:sp>
+      <p:sp>
+        <p:nvSpPr>
+          <p:cNvPr id="4" name="Slide Number Placeholder 3"/>
+          <p:cNvSpPr>
+            <a:spLocks noGrp="1"/>
+          </p:cNvSpPr>
+          <p:nvPr>
+            <p:ph type="sldNum" sz="quarter" idx="10"/>
+          </p:nvPr>
+        </p:nvSpPr>
+        <p:spPr/>
+        <p:txBody>
+          <a:bodyPr/>
+          <a:lstStyle/>
+          <a:p>
+            <a:fld id="{7EA3D747-5010-4123-83E3-616627F571BA}" type="slidenum">
+              <a:rPr lang="en-US" smtClean="0"/>
+              <a:t>3</a:t>
+            </a:fld>
+            <a:endParaRPr lang="en-US"/>
+          </a:p>
+        </p:txBody>
+      </p:sp>
+    </p:spTree>
+    <p:extLst>
+      <p:ext uri="{BB962C8B-B14F-4D97-AF65-F5344CB8AC3E}">
+        <p14:creationId xmlns:p14="http://schemas.microsoft.com/office/powerpoint/2010/main" val="946250157"/>
+      </p:ext>
+    </p:extLst>
+  </p:cSld>
+  <p:clrMapOvr>
+    <a:masterClrMapping/>
+  </p:clrMapOvr>
+</p:notes>
 </file>
 
 <file path=ppt/slideLayouts/slideLayout1.xml><?xml version="1.0" encoding="utf-8"?>
@@ -4246,6 +4680,4057 @@
     <p:extLst>
       <p:ext uri="{BB962C8B-B14F-4D97-AF65-F5344CB8AC3E}">
         <p14:creationId xmlns:p14="http://schemas.microsoft.com/office/powerpoint/2010/main" val="2483498332"/>
+      </p:ext>
+    </p:extLst>
+  </p:cSld>
+  <p:clrMapOvr>
+    <a:masterClrMapping/>
+  </p:clrMapOvr>
+</p:sld>
+</file>
+
+<file path=ppt/slides/slide3.xml><?xml version="1.0" encoding="utf-8"?>
+<p:sld xmlns:a="http://schemas.openxmlformats.org/drawingml/2006/main" xmlns:r="http://schemas.openxmlformats.org/officeDocument/2006/relationships" xmlns:p="http://schemas.openxmlformats.org/presentationml/2006/main">
+  <p:cSld>
+    <p:spTree>
+      <p:nvGrpSpPr>
+        <p:cNvPr id="1" name=""/>
+        <p:cNvGrpSpPr/>
+        <p:nvPr/>
+      </p:nvGrpSpPr>
+      <p:grpSpPr>
+        <a:xfrm>
+          <a:off x="0" y="0"/>
+          <a:ext cx="0" cy="0"/>
+          <a:chOff x="0" y="0"/>
+          <a:chExt cx="0" cy="0"/>
+        </a:xfrm>
+      </p:grpSpPr>
+      <p:pic>
+        <p:nvPicPr>
+          <p:cNvPr id="4" name="Content Placeholder 4" descr="A picture containing shoji, building&#10;&#10;Description generated with high confidence">
+            <a:extLst>
+              <a:ext uri="{FF2B5EF4-FFF2-40B4-BE49-F238E27FC236}">
+                <a16:creationId xmlns:a16="http://schemas.microsoft.com/office/drawing/2014/main" id="{7C870DD0-9DA3-4978-9E43-38B30D3DB75B}"/>
+              </a:ext>
+            </a:extLst>
+          </p:cNvPr>
+          <p:cNvPicPr>
+            <a:picLocks noChangeAspect="1"/>
+          </p:cNvPicPr>
+          <p:nvPr/>
+        </p:nvPicPr>
+        <p:blipFill rotWithShape="1">
+          <a:blip r:embed="rId3">
+            <a:extLst>
+              <a:ext uri="{28A0092B-C50C-407E-A947-70E740481C1C}">
+                <a14:useLocalDpi xmlns:a14="http://schemas.microsoft.com/office/drawing/2010/main" val="0"/>
+              </a:ext>
+            </a:extLst>
+          </a:blip>
+          <a:srcRect t="1" b="-66"/>
+          <a:stretch/>
+        </p:blipFill>
+        <p:spPr>
+          <a:xfrm>
+            <a:off x="3279782" y="365125"/>
+            <a:ext cx="6038390" cy="6053092"/>
+          </a:xfrm>
+          <a:prstGeom prst="rect">
+            <a:avLst/>
+          </a:prstGeom>
+        </p:spPr>
+      </p:pic>
+      <p:cxnSp>
+        <p:nvCxnSpPr>
+          <p:cNvPr id="6" name="Straight Arrow Connector 5">
+            <a:extLst>
+              <a:ext uri="{FF2B5EF4-FFF2-40B4-BE49-F238E27FC236}">
+                <a16:creationId xmlns:a16="http://schemas.microsoft.com/office/drawing/2014/main" id="{88846043-E776-48EF-BDBA-918521F56225}"/>
+              </a:ext>
+            </a:extLst>
+          </p:cNvPr>
+          <p:cNvCxnSpPr/>
+          <p:nvPr/>
+        </p:nvCxnSpPr>
+        <p:spPr>
+          <a:xfrm>
+            <a:off x="3997235" y="3701143"/>
+            <a:ext cx="383177" cy="0"/>
+          </a:xfrm>
+          <a:prstGeom prst="straightConnector1">
+            <a:avLst/>
+          </a:prstGeom>
+          <a:ln w="38100">
+            <a:tailEnd type="triangle"/>
+          </a:ln>
+        </p:spPr>
+        <p:style>
+          <a:lnRef idx="3">
+            <a:schemeClr val="accent6"/>
+          </a:lnRef>
+          <a:fillRef idx="0">
+            <a:schemeClr val="accent6"/>
+          </a:fillRef>
+          <a:effectRef idx="2">
+            <a:schemeClr val="accent6"/>
+          </a:effectRef>
+          <a:fontRef idx="minor">
+            <a:schemeClr val="tx1"/>
+          </a:fontRef>
+        </p:style>
+      </p:cxnSp>
+      <p:cxnSp>
+        <p:nvCxnSpPr>
+          <p:cNvPr id="7" name="Straight Arrow Connector 6">
+            <a:extLst>
+              <a:ext uri="{FF2B5EF4-FFF2-40B4-BE49-F238E27FC236}">
+                <a16:creationId xmlns:a16="http://schemas.microsoft.com/office/drawing/2014/main" id="{57D36908-C121-4CE1-8CF1-FF5C93D04E3B}"/>
+              </a:ext>
+            </a:extLst>
+          </p:cNvPr>
+          <p:cNvCxnSpPr/>
+          <p:nvPr/>
+        </p:nvCxnSpPr>
+        <p:spPr>
+          <a:xfrm>
+            <a:off x="4598123" y="3692434"/>
+            <a:ext cx="383177" cy="0"/>
+          </a:xfrm>
+          <a:prstGeom prst="straightConnector1">
+            <a:avLst/>
+          </a:prstGeom>
+          <a:ln w="38100">
+            <a:tailEnd type="triangle"/>
+          </a:ln>
+        </p:spPr>
+        <p:style>
+          <a:lnRef idx="3">
+            <a:schemeClr val="accent6"/>
+          </a:lnRef>
+          <a:fillRef idx="0">
+            <a:schemeClr val="accent6"/>
+          </a:fillRef>
+          <a:effectRef idx="2">
+            <a:schemeClr val="accent6"/>
+          </a:effectRef>
+          <a:fontRef idx="minor">
+            <a:schemeClr val="tx1"/>
+          </a:fontRef>
+        </p:style>
+      </p:cxnSp>
+      <p:cxnSp>
+        <p:nvCxnSpPr>
+          <p:cNvPr id="8" name="Straight Arrow Connector 7">
+            <a:extLst>
+              <a:ext uri="{FF2B5EF4-FFF2-40B4-BE49-F238E27FC236}">
+                <a16:creationId xmlns:a16="http://schemas.microsoft.com/office/drawing/2014/main" id="{1AE8F9FC-86B1-4189-8E77-B4B94BBB5529}"/>
+              </a:ext>
+            </a:extLst>
+          </p:cNvPr>
+          <p:cNvCxnSpPr/>
+          <p:nvPr/>
+        </p:nvCxnSpPr>
+        <p:spPr>
+          <a:xfrm>
+            <a:off x="5199021" y="3692434"/>
+            <a:ext cx="383177" cy="0"/>
+          </a:xfrm>
+          <a:prstGeom prst="straightConnector1">
+            <a:avLst/>
+          </a:prstGeom>
+          <a:ln w="38100">
+            <a:tailEnd type="triangle"/>
+          </a:ln>
+        </p:spPr>
+        <p:style>
+          <a:lnRef idx="3">
+            <a:schemeClr val="accent6"/>
+          </a:lnRef>
+          <a:fillRef idx="0">
+            <a:schemeClr val="accent6"/>
+          </a:fillRef>
+          <a:effectRef idx="2">
+            <a:schemeClr val="accent6"/>
+          </a:effectRef>
+          <a:fontRef idx="minor">
+            <a:schemeClr val="tx1"/>
+          </a:fontRef>
+        </p:style>
+      </p:cxnSp>
+      <p:cxnSp>
+        <p:nvCxnSpPr>
+          <p:cNvPr id="9" name="Straight Arrow Connector 8">
+            <a:extLst>
+              <a:ext uri="{FF2B5EF4-FFF2-40B4-BE49-F238E27FC236}">
+                <a16:creationId xmlns:a16="http://schemas.microsoft.com/office/drawing/2014/main" id="{AAD1CFAB-D0ED-4EA2-ACAB-CD9CEE9BB2F5}"/>
+              </a:ext>
+            </a:extLst>
+          </p:cNvPr>
+          <p:cNvCxnSpPr/>
+          <p:nvPr/>
+        </p:nvCxnSpPr>
+        <p:spPr>
+          <a:xfrm>
+            <a:off x="5808626" y="3692434"/>
+            <a:ext cx="383177" cy="0"/>
+          </a:xfrm>
+          <a:prstGeom prst="straightConnector1">
+            <a:avLst/>
+          </a:prstGeom>
+          <a:ln w="38100">
+            <a:tailEnd type="triangle"/>
+          </a:ln>
+        </p:spPr>
+        <p:style>
+          <a:lnRef idx="3">
+            <a:schemeClr val="accent6"/>
+          </a:lnRef>
+          <a:fillRef idx="0">
+            <a:schemeClr val="accent6"/>
+          </a:fillRef>
+          <a:effectRef idx="2">
+            <a:schemeClr val="accent6"/>
+          </a:effectRef>
+          <a:fontRef idx="minor">
+            <a:schemeClr val="tx1"/>
+          </a:fontRef>
+        </p:style>
+      </p:cxnSp>
+      <p:cxnSp>
+        <p:nvCxnSpPr>
+          <p:cNvPr id="10" name="Straight Arrow Connector 9">
+            <a:extLst>
+              <a:ext uri="{FF2B5EF4-FFF2-40B4-BE49-F238E27FC236}">
+                <a16:creationId xmlns:a16="http://schemas.microsoft.com/office/drawing/2014/main" id="{9620628F-FD17-4094-BEDA-EAEF89E65B6C}"/>
+              </a:ext>
+            </a:extLst>
+          </p:cNvPr>
+          <p:cNvCxnSpPr/>
+          <p:nvPr/>
+        </p:nvCxnSpPr>
+        <p:spPr>
+          <a:xfrm>
+            <a:off x="6418227" y="3692434"/>
+            <a:ext cx="383177" cy="0"/>
+          </a:xfrm>
+          <a:prstGeom prst="straightConnector1">
+            <a:avLst/>
+          </a:prstGeom>
+          <a:ln w="38100">
+            <a:tailEnd type="triangle"/>
+          </a:ln>
+        </p:spPr>
+        <p:style>
+          <a:lnRef idx="3">
+            <a:schemeClr val="accent6"/>
+          </a:lnRef>
+          <a:fillRef idx="0">
+            <a:schemeClr val="accent6"/>
+          </a:fillRef>
+          <a:effectRef idx="2">
+            <a:schemeClr val="accent6"/>
+          </a:effectRef>
+          <a:fontRef idx="minor">
+            <a:schemeClr val="tx1"/>
+          </a:fontRef>
+        </p:style>
+      </p:cxnSp>
+      <p:cxnSp>
+        <p:nvCxnSpPr>
+          <p:cNvPr id="11" name="Straight Arrow Connector 10">
+            <a:extLst>
+              <a:ext uri="{FF2B5EF4-FFF2-40B4-BE49-F238E27FC236}">
+                <a16:creationId xmlns:a16="http://schemas.microsoft.com/office/drawing/2014/main" id="{B20093EF-EB58-42F7-9268-96B31C223D6D}"/>
+              </a:ext>
+            </a:extLst>
+          </p:cNvPr>
+          <p:cNvCxnSpPr/>
+          <p:nvPr/>
+        </p:nvCxnSpPr>
+        <p:spPr>
+          <a:xfrm>
+            <a:off x="7010408" y="3692434"/>
+            <a:ext cx="383177" cy="0"/>
+          </a:xfrm>
+          <a:prstGeom prst="straightConnector1">
+            <a:avLst/>
+          </a:prstGeom>
+          <a:ln w="38100">
+            <a:tailEnd type="triangle"/>
+          </a:ln>
+        </p:spPr>
+        <p:style>
+          <a:lnRef idx="3">
+            <a:schemeClr val="accent6"/>
+          </a:lnRef>
+          <a:fillRef idx="0">
+            <a:schemeClr val="accent6"/>
+          </a:fillRef>
+          <a:effectRef idx="2">
+            <a:schemeClr val="accent6"/>
+          </a:effectRef>
+          <a:fontRef idx="minor">
+            <a:schemeClr val="tx1"/>
+          </a:fontRef>
+        </p:style>
+      </p:cxnSp>
+      <p:cxnSp>
+        <p:nvCxnSpPr>
+          <p:cNvPr id="12" name="Straight Arrow Connector 11">
+            <a:extLst>
+              <a:ext uri="{FF2B5EF4-FFF2-40B4-BE49-F238E27FC236}">
+                <a16:creationId xmlns:a16="http://schemas.microsoft.com/office/drawing/2014/main" id="{1901C1D4-2170-40F6-862A-09F75E0DB74E}"/>
+              </a:ext>
+            </a:extLst>
+          </p:cNvPr>
+          <p:cNvCxnSpPr/>
+          <p:nvPr/>
+        </p:nvCxnSpPr>
+        <p:spPr>
+          <a:xfrm>
+            <a:off x="7593883" y="3692434"/>
+            <a:ext cx="383177" cy="0"/>
+          </a:xfrm>
+          <a:prstGeom prst="straightConnector1">
+            <a:avLst/>
+          </a:prstGeom>
+          <a:ln w="38100">
+            <a:tailEnd type="triangle"/>
+          </a:ln>
+        </p:spPr>
+        <p:style>
+          <a:lnRef idx="3">
+            <a:schemeClr val="accent6"/>
+          </a:lnRef>
+          <a:fillRef idx="0">
+            <a:schemeClr val="accent6"/>
+          </a:fillRef>
+          <a:effectRef idx="2">
+            <a:schemeClr val="accent6"/>
+          </a:effectRef>
+          <a:fontRef idx="minor">
+            <a:schemeClr val="tx1"/>
+          </a:fontRef>
+        </p:style>
+      </p:cxnSp>
+      <p:cxnSp>
+        <p:nvCxnSpPr>
+          <p:cNvPr id="13" name="Straight Arrow Connector 12">
+            <a:extLst>
+              <a:ext uri="{FF2B5EF4-FFF2-40B4-BE49-F238E27FC236}">
+                <a16:creationId xmlns:a16="http://schemas.microsoft.com/office/drawing/2014/main" id="{45CD94F7-47D7-4D43-88AE-79EE10C3EA77}"/>
+              </a:ext>
+            </a:extLst>
+          </p:cNvPr>
+          <p:cNvCxnSpPr/>
+          <p:nvPr/>
+        </p:nvCxnSpPr>
+        <p:spPr>
+          <a:xfrm>
+            <a:off x="8194780" y="3692434"/>
+            <a:ext cx="383177" cy="0"/>
+          </a:xfrm>
+          <a:prstGeom prst="straightConnector1">
+            <a:avLst/>
+          </a:prstGeom>
+          <a:ln w="38100">
+            <a:tailEnd type="triangle"/>
+          </a:ln>
+        </p:spPr>
+        <p:style>
+          <a:lnRef idx="3">
+            <a:schemeClr val="accent6"/>
+          </a:lnRef>
+          <a:fillRef idx="0">
+            <a:schemeClr val="accent6"/>
+          </a:fillRef>
+          <a:effectRef idx="2">
+            <a:schemeClr val="accent6"/>
+          </a:effectRef>
+          <a:fontRef idx="minor">
+            <a:schemeClr val="tx1"/>
+          </a:fontRef>
+        </p:style>
+      </p:cxnSp>
+      <p:cxnSp>
+        <p:nvCxnSpPr>
+          <p:cNvPr id="14" name="Straight Arrow Connector 13">
+            <a:extLst>
+              <a:ext uri="{FF2B5EF4-FFF2-40B4-BE49-F238E27FC236}">
+                <a16:creationId xmlns:a16="http://schemas.microsoft.com/office/drawing/2014/main" id="{19855BE3-D90A-4146-A272-501D16008CA4}"/>
+              </a:ext>
+            </a:extLst>
+          </p:cNvPr>
+          <p:cNvCxnSpPr/>
+          <p:nvPr/>
+        </p:nvCxnSpPr>
+        <p:spPr>
+          <a:xfrm>
+            <a:off x="3988526" y="3100243"/>
+            <a:ext cx="383177" cy="0"/>
+          </a:xfrm>
+          <a:prstGeom prst="straightConnector1">
+            <a:avLst/>
+          </a:prstGeom>
+          <a:ln w="38100">
+            <a:tailEnd type="triangle"/>
+          </a:ln>
+        </p:spPr>
+        <p:style>
+          <a:lnRef idx="3">
+            <a:schemeClr val="accent6"/>
+          </a:lnRef>
+          <a:fillRef idx="0">
+            <a:schemeClr val="accent6"/>
+          </a:fillRef>
+          <a:effectRef idx="2">
+            <a:schemeClr val="accent6"/>
+          </a:effectRef>
+          <a:fontRef idx="minor">
+            <a:schemeClr val="tx1"/>
+          </a:fontRef>
+        </p:style>
+      </p:cxnSp>
+      <p:cxnSp>
+        <p:nvCxnSpPr>
+          <p:cNvPr id="15" name="Straight Arrow Connector 14">
+            <a:extLst>
+              <a:ext uri="{FF2B5EF4-FFF2-40B4-BE49-F238E27FC236}">
+                <a16:creationId xmlns:a16="http://schemas.microsoft.com/office/drawing/2014/main" id="{2A05D6EC-7679-40CD-B931-CE2DEF25C9DB}"/>
+              </a:ext>
+            </a:extLst>
+          </p:cNvPr>
+          <p:cNvCxnSpPr/>
+          <p:nvPr/>
+        </p:nvCxnSpPr>
+        <p:spPr>
+          <a:xfrm>
+            <a:off x="3988526" y="2508071"/>
+            <a:ext cx="383177" cy="0"/>
+          </a:xfrm>
+          <a:prstGeom prst="straightConnector1">
+            <a:avLst/>
+          </a:prstGeom>
+          <a:ln w="38100">
+            <a:tailEnd type="triangle"/>
+          </a:ln>
+        </p:spPr>
+        <p:style>
+          <a:lnRef idx="3">
+            <a:schemeClr val="accent6"/>
+          </a:lnRef>
+          <a:fillRef idx="0">
+            <a:schemeClr val="accent6"/>
+          </a:fillRef>
+          <a:effectRef idx="2">
+            <a:schemeClr val="accent6"/>
+          </a:effectRef>
+          <a:fontRef idx="minor">
+            <a:schemeClr val="tx1"/>
+          </a:fontRef>
+        </p:style>
+      </p:cxnSp>
+      <p:cxnSp>
+        <p:nvCxnSpPr>
+          <p:cNvPr id="16" name="Straight Arrow Connector 15">
+            <a:extLst>
+              <a:ext uri="{FF2B5EF4-FFF2-40B4-BE49-F238E27FC236}">
+                <a16:creationId xmlns:a16="http://schemas.microsoft.com/office/drawing/2014/main" id="{058ADF61-3C90-45EE-9545-342EF1ACF440}"/>
+              </a:ext>
+            </a:extLst>
+          </p:cNvPr>
+          <p:cNvCxnSpPr/>
+          <p:nvPr/>
+        </p:nvCxnSpPr>
+        <p:spPr>
+          <a:xfrm>
+            <a:off x="3988526" y="1889760"/>
+            <a:ext cx="383177" cy="0"/>
+          </a:xfrm>
+          <a:prstGeom prst="straightConnector1">
+            <a:avLst/>
+          </a:prstGeom>
+          <a:ln w="38100">
+            <a:tailEnd type="triangle"/>
+          </a:ln>
+        </p:spPr>
+        <p:style>
+          <a:lnRef idx="3">
+            <a:schemeClr val="accent6"/>
+          </a:lnRef>
+          <a:fillRef idx="0">
+            <a:schemeClr val="accent6"/>
+          </a:fillRef>
+          <a:effectRef idx="2">
+            <a:schemeClr val="accent6"/>
+          </a:effectRef>
+          <a:fontRef idx="minor">
+            <a:schemeClr val="tx1"/>
+          </a:fontRef>
+        </p:style>
+      </p:cxnSp>
+      <p:cxnSp>
+        <p:nvCxnSpPr>
+          <p:cNvPr id="17" name="Straight Arrow Connector 16">
+            <a:extLst>
+              <a:ext uri="{FF2B5EF4-FFF2-40B4-BE49-F238E27FC236}">
+                <a16:creationId xmlns:a16="http://schemas.microsoft.com/office/drawing/2014/main" id="{708EA9DE-BAB1-41E1-AF6A-D0F248740FD5}"/>
+              </a:ext>
+            </a:extLst>
+          </p:cNvPr>
+          <p:cNvCxnSpPr/>
+          <p:nvPr/>
+        </p:nvCxnSpPr>
+        <p:spPr>
+          <a:xfrm>
+            <a:off x="3988526" y="1288855"/>
+            <a:ext cx="383177" cy="0"/>
+          </a:xfrm>
+          <a:prstGeom prst="straightConnector1">
+            <a:avLst/>
+          </a:prstGeom>
+          <a:ln w="38100">
+            <a:tailEnd type="triangle"/>
+          </a:ln>
+        </p:spPr>
+        <p:style>
+          <a:lnRef idx="3">
+            <a:schemeClr val="accent6"/>
+          </a:lnRef>
+          <a:fillRef idx="0">
+            <a:schemeClr val="accent6"/>
+          </a:fillRef>
+          <a:effectRef idx="2">
+            <a:schemeClr val="accent6"/>
+          </a:effectRef>
+          <a:fontRef idx="minor">
+            <a:schemeClr val="tx1"/>
+          </a:fontRef>
+        </p:style>
+      </p:cxnSp>
+      <p:cxnSp>
+        <p:nvCxnSpPr>
+          <p:cNvPr id="18" name="Straight Arrow Connector 17">
+            <a:extLst>
+              <a:ext uri="{FF2B5EF4-FFF2-40B4-BE49-F238E27FC236}">
+                <a16:creationId xmlns:a16="http://schemas.microsoft.com/office/drawing/2014/main" id="{CDE3D4C8-9372-4CE4-985D-909D0E4CC6F2}"/>
+              </a:ext>
+            </a:extLst>
+          </p:cNvPr>
+          <p:cNvCxnSpPr/>
+          <p:nvPr/>
+        </p:nvCxnSpPr>
+        <p:spPr>
+          <a:xfrm>
+            <a:off x="3387635" y="3091543"/>
+            <a:ext cx="383177" cy="0"/>
+          </a:xfrm>
+          <a:prstGeom prst="straightConnector1">
+            <a:avLst/>
+          </a:prstGeom>
+          <a:ln w="38100">
+            <a:tailEnd type="triangle"/>
+          </a:ln>
+        </p:spPr>
+        <p:style>
+          <a:lnRef idx="3">
+            <a:schemeClr val="accent6"/>
+          </a:lnRef>
+          <a:fillRef idx="0">
+            <a:schemeClr val="accent6"/>
+          </a:fillRef>
+          <a:effectRef idx="2">
+            <a:schemeClr val="accent6"/>
+          </a:effectRef>
+          <a:fontRef idx="minor">
+            <a:schemeClr val="tx1"/>
+          </a:fontRef>
+        </p:style>
+      </p:cxnSp>
+      <p:cxnSp>
+        <p:nvCxnSpPr>
+          <p:cNvPr id="19" name="Straight Arrow Connector 18">
+            <a:extLst>
+              <a:ext uri="{FF2B5EF4-FFF2-40B4-BE49-F238E27FC236}">
+                <a16:creationId xmlns:a16="http://schemas.microsoft.com/office/drawing/2014/main" id="{F27276B3-60FB-454E-BE6E-4B02986B60C3}"/>
+              </a:ext>
+            </a:extLst>
+          </p:cNvPr>
+          <p:cNvCxnSpPr/>
+          <p:nvPr/>
+        </p:nvCxnSpPr>
+        <p:spPr>
+          <a:xfrm>
+            <a:off x="3988526" y="696676"/>
+            <a:ext cx="383177" cy="0"/>
+          </a:xfrm>
+          <a:prstGeom prst="straightConnector1">
+            <a:avLst/>
+          </a:prstGeom>
+          <a:ln w="38100">
+            <a:tailEnd type="triangle"/>
+          </a:ln>
+        </p:spPr>
+        <p:style>
+          <a:lnRef idx="3">
+            <a:schemeClr val="accent6"/>
+          </a:lnRef>
+          <a:fillRef idx="0">
+            <a:schemeClr val="accent6"/>
+          </a:fillRef>
+          <a:effectRef idx="2">
+            <a:schemeClr val="accent6"/>
+          </a:effectRef>
+          <a:fontRef idx="minor">
+            <a:schemeClr val="tx1"/>
+          </a:fontRef>
+        </p:style>
+      </p:cxnSp>
+      <p:cxnSp>
+        <p:nvCxnSpPr>
+          <p:cNvPr id="20" name="Straight Arrow Connector 19">
+            <a:extLst>
+              <a:ext uri="{FF2B5EF4-FFF2-40B4-BE49-F238E27FC236}">
+                <a16:creationId xmlns:a16="http://schemas.microsoft.com/office/drawing/2014/main" id="{342DD52E-A303-47B3-A0C2-273AF08A702F}"/>
+              </a:ext>
+            </a:extLst>
+          </p:cNvPr>
+          <p:cNvCxnSpPr/>
+          <p:nvPr/>
+        </p:nvCxnSpPr>
+        <p:spPr>
+          <a:xfrm>
+            <a:off x="3988526" y="4302037"/>
+            <a:ext cx="383177" cy="0"/>
+          </a:xfrm>
+          <a:prstGeom prst="straightConnector1">
+            <a:avLst/>
+          </a:prstGeom>
+          <a:ln w="38100">
+            <a:tailEnd type="triangle"/>
+          </a:ln>
+        </p:spPr>
+        <p:style>
+          <a:lnRef idx="3">
+            <a:schemeClr val="accent6"/>
+          </a:lnRef>
+          <a:fillRef idx="0">
+            <a:schemeClr val="accent6"/>
+          </a:fillRef>
+          <a:effectRef idx="2">
+            <a:schemeClr val="accent6"/>
+          </a:effectRef>
+          <a:fontRef idx="minor">
+            <a:schemeClr val="tx1"/>
+          </a:fontRef>
+        </p:style>
+      </p:cxnSp>
+      <p:cxnSp>
+        <p:nvCxnSpPr>
+          <p:cNvPr id="21" name="Straight Arrow Connector 20">
+            <a:extLst>
+              <a:ext uri="{FF2B5EF4-FFF2-40B4-BE49-F238E27FC236}">
+                <a16:creationId xmlns:a16="http://schemas.microsoft.com/office/drawing/2014/main" id="{C3702323-6533-452B-885E-5A5E16F59A03}"/>
+              </a:ext>
+            </a:extLst>
+          </p:cNvPr>
+          <p:cNvCxnSpPr/>
+          <p:nvPr/>
+        </p:nvCxnSpPr>
+        <p:spPr>
+          <a:xfrm>
+            <a:off x="3988526" y="4894213"/>
+            <a:ext cx="383177" cy="0"/>
+          </a:xfrm>
+          <a:prstGeom prst="straightConnector1">
+            <a:avLst/>
+          </a:prstGeom>
+          <a:ln w="38100">
+            <a:tailEnd type="triangle"/>
+          </a:ln>
+        </p:spPr>
+        <p:style>
+          <a:lnRef idx="3">
+            <a:schemeClr val="accent6"/>
+          </a:lnRef>
+          <a:fillRef idx="0">
+            <a:schemeClr val="accent6"/>
+          </a:fillRef>
+          <a:effectRef idx="2">
+            <a:schemeClr val="accent6"/>
+          </a:effectRef>
+          <a:fontRef idx="minor">
+            <a:schemeClr val="tx1"/>
+          </a:fontRef>
+        </p:style>
+      </p:cxnSp>
+      <p:cxnSp>
+        <p:nvCxnSpPr>
+          <p:cNvPr id="22" name="Straight Arrow Connector 21">
+            <a:extLst>
+              <a:ext uri="{FF2B5EF4-FFF2-40B4-BE49-F238E27FC236}">
+                <a16:creationId xmlns:a16="http://schemas.microsoft.com/office/drawing/2014/main" id="{F2CAE66C-9293-4A7A-A3E8-BC4B6BC4B99C}"/>
+              </a:ext>
+            </a:extLst>
+          </p:cNvPr>
+          <p:cNvCxnSpPr/>
+          <p:nvPr/>
+        </p:nvCxnSpPr>
+        <p:spPr>
+          <a:xfrm>
+            <a:off x="3988526" y="5503825"/>
+            <a:ext cx="383177" cy="0"/>
+          </a:xfrm>
+          <a:prstGeom prst="straightConnector1">
+            <a:avLst/>
+          </a:prstGeom>
+          <a:ln w="38100">
+            <a:tailEnd type="triangle"/>
+          </a:ln>
+        </p:spPr>
+        <p:style>
+          <a:lnRef idx="3">
+            <a:schemeClr val="accent6"/>
+          </a:lnRef>
+          <a:fillRef idx="0">
+            <a:schemeClr val="accent6"/>
+          </a:fillRef>
+          <a:effectRef idx="2">
+            <a:schemeClr val="accent6"/>
+          </a:effectRef>
+          <a:fontRef idx="minor">
+            <a:schemeClr val="tx1"/>
+          </a:fontRef>
+        </p:style>
+      </p:cxnSp>
+      <p:cxnSp>
+        <p:nvCxnSpPr>
+          <p:cNvPr id="23" name="Straight Arrow Connector 22">
+            <a:extLst>
+              <a:ext uri="{FF2B5EF4-FFF2-40B4-BE49-F238E27FC236}">
+                <a16:creationId xmlns:a16="http://schemas.microsoft.com/office/drawing/2014/main" id="{94465702-0B71-447F-BE51-A3CEA8619A04}"/>
+              </a:ext>
+            </a:extLst>
+          </p:cNvPr>
+          <p:cNvCxnSpPr/>
+          <p:nvPr/>
+        </p:nvCxnSpPr>
+        <p:spPr>
+          <a:xfrm>
+            <a:off x="3988526" y="6113423"/>
+            <a:ext cx="383177" cy="0"/>
+          </a:xfrm>
+          <a:prstGeom prst="straightConnector1">
+            <a:avLst/>
+          </a:prstGeom>
+          <a:ln w="38100">
+            <a:tailEnd type="triangle"/>
+          </a:ln>
+        </p:spPr>
+        <p:style>
+          <a:lnRef idx="3">
+            <a:schemeClr val="accent6"/>
+          </a:lnRef>
+          <a:fillRef idx="0">
+            <a:schemeClr val="accent6"/>
+          </a:fillRef>
+          <a:effectRef idx="2">
+            <a:schemeClr val="accent6"/>
+          </a:effectRef>
+          <a:fontRef idx="minor">
+            <a:schemeClr val="tx1"/>
+          </a:fontRef>
+        </p:style>
+      </p:cxnSp>
+      <p:cxnSp>
+        <p:nvCxnSpPr>
+          <p:cNvPr id="24" name="Straight Arrow Connector 23">
+            <a:extLst>
+              <a:ext uri="{FF2B5EF4-FFF2-40B4-BE49-F238E27FC236}">
+                <a16:creationId xmlns:a16="http://schemas.microsoft.com/office/drawing/2014/main" id="{8F058ED1-2C26-48CD-9D2A-61A2FE27F901}"/>
+              </a:ext>
+            </a:extLst>
+          </p:cNvPr>
+          <p:cNvCxnSpPr/>
+          <p:nvPr/>
+        </p:nvCxnSpPr>
+        <p:spPr>
+          <a:xfrm>
+            <a:off x="3405050" y="2508061"/>
+            <a:ext cx="383177" cy="0"/>
+          </a:xfrm>
+          <a:prstGeom prst="straightConnector1">
+            <a:avLst/>
+          </a:prstGeom>
+          <a:ln w="38100">
+            <a:tailEnd type="triangle"/>
+          </a:ln>
+        </p:spPr>
+        <p:style>
+          <a:lnRef idx="3">
+            <a:schemeClr val="accent6"/>
+          </a:lnRef>
+          <a:fillRef idx="0">
+            <a:schemeClr val="accent6"/>
+          </a:fillRef>
+          <a:effectRef idx="2">
+            <a:schemeClr val="accent6"/>
+          </a:effectRef>
+          <a:fontRef idx="minor">
+            <a:schemeClr val="tx1"/>
+          </a:fontRef>
+        </p:style>
+      </p:cxnSp>
+      <p:cxnSp>
+        <p:nvCxnSpPr>
+          <p:cNvPr id="26" name="Straight Arrow Connector 25">
+            <a:extLst>
+              <a:ext uri="{FF2B5EF4-FFF2-40B4-BE49-F238E27FC236}">
+                <a16:creationId xmlns:a16="http://schemas.microsoft.com/office/drawing/2014/main" id="{F60D902B-E905-49F8-B651-89C091AF2368}"/>
+              </a:ext>
+            </a:extLst>
+          </p:cNvPr>
+          <p:cNvCxnSpPr/>
+          <p:nvPr/>
+        </p:nvCxnSpPr>
+        <p:spPr>
+          <a:xfrm>
+            <a:off x="3418111" y="1894105"/>
+            <a:ext cx="383177" cy="0"/>
+          </a:xfrm>
+          <a:prstGeom prst="straightConnector1">
+            <a:avLst/>
+          </a:prstGeom>
+          <a:ln w="38100">
+            <a:tailEnd type="triangle"/>
+          </a:ln>
+        </p:spPr>
+        <p:style>
+          <a:lnRef idx="3">
+            <a:schemeClr val="accent6"/>
+          </a:lnRef>
+          <a:fillRef idx="0">
+            <a:schemeClr val="accent6"/>
+          </a:fillRef>
+          <a:effectRef idx="2">
+            <a:schemeClr val="accent6"/>
+          </a:effectRef>
+          <a:fontRef idx="minor">
+            <a:schemeClr val="tx1"/>
+          </a:fontRef>
+        </p:style>
+      </p:cxnSp>
+      <p:cxnSp>
+        <p:nvCxnSpPr>
+          <p:cNvPr id="27" name="Straight Arrow Connector 26">
+            <a:extLst>
+              <a:ext uri="{FF2B5EF4-FFF2-40B4-BE49-F238E27FC236}">
+                <a16:creationId xmlns:a16="http://schemas.microsoft.com/office/drawing/2014/main" id="{D4CF7CDE-FDC4-4BC4-B6E9-269FE09169B6}"/>
+              </a:ext>
+            </a:extLst>
+          </p:cNvPr>
+          <p:cNvCxnSpPr/>
+          <p:nvPr/>
+        </p:nvCxnSpPr>
+        <p:spPr>
+          <a:xfrm>
+            <a:off x="3418110" y="1293213"/>
+            <a:ext cx="383177" cy="0"/>
+          </a:xfrm>
+          <a:prstGeom prst="straightConnector1">
+            <a:avLst/>
+          </a:prstGeom>
+          <a:ln w="38100">
+            <a:tailEnd type="triangle"/>
+          </a:ln>
+        </p:spPr>
+        <p:style>
+          <a:lnRef idx="3">
+            <a:schemeClr val="accent6"/>
+          </a:lnRef>
+          <a:fillRef idx="0">
+            <a:schemeClr val="accent6"/>
+          </a:fillRef>
+          <a:effectRef idx="2">
+            <a:schemeClr val="accent6"/>
+          </a:effectRef>
+          <a:fontRef idx="minor">
+            <a:schemeClr val="tx1"/>
+          </a:fontRef>
+        </p:style>
+      </p:cxnSp>
+      <p:cxnSp>
+        <p:nvCxnSpPr>
+          <p:cNvPr id="28" name="Straight Arrow Connector 27">
+            <a:extLst>
+              <a:ext uri="{FF2B5EF4-FFF2-40B4-BE49-F238E27FC236}">
+                <a16:creationId xmlns:a16="http://schemas.microsoft.com/office/drawing/2014/main" id="{DBABE30E-A12B-40B1-A708-7EC2A29F0605}"/>
+              </a:ext>
+            </a:extLst>
+          </p:cNvPr>
+          <p:cNvCxnSpPr/>
+          <p:nvPr/>
+        </p:nvCxnSpPr>
+        <p:spPr>
+          <a:xfrm>
+            <a:off x="3418110" y="692326"/>
+            <a:ext cx="383177" cy="0"/>
+          </a:xfrm>
+          <a:prstGeom prst="straightConnector1">
+            <a:avLst/>
+          </a:prstGeom>
+          <a:ln w="38100">
+            <a:tailEnd type="triangle"/>
+          </a:ln>
+        </p:spPr>
+        <p:style>
+          <a:lnRef idx="3">
+            <a:schemeClr val="accent6"/>
+          </a:lnRef>
+          <a:fillRef idx="0">
+            <a:schemeClr val="accent6"/>
+          </a:fillRef>
+          <a:effectRef idx="2">
+            <a:schemeClr val="accent6"/>
+          </a:effectRef>
+          <a:fontRef idx="minor">
+            <a:schemeClr val="tx1"/>
+          </a:fontRef>
+        </p:style>
+      </p:cxnSp>
+      <p:cxnSp>
+        <p:nvCxnSpPr>
+          <p:cNvPr id="29" name="Straight Arrow Connector 28">
+            <a:extLst>
+              <a:ext uri="{FF2B5EF4-FFF2-40B4-BE49-F238E27FC236}">
+                <a16:creationId xmlns:a16="http://schemas.microsoft.com/office/drawing/2014/main" id="{FBC917AF-F8F7-4F03-BFEF-0D0B115D6E4E}"/>
+              </a:ext>
+            </a:extLst>
+          </p:cNvPr>
+          <p:cNvCxnSpPr/>
+          <p:nvPr/>
+        </p:nvCxnSpPr>
+        <p:spPr>
+          <a:xfrm>
+            <a:off x="3418110" y="4302037"/>
+            <a:ext cx="383177" cy="0"/>
+          </a:xfrm>
+          <a:prstGeom prst="straightConnector1">
+            <a:avLst/>
+          </a:prstGeom>
+          <a:ln w="38100">
+            <a:tailEnd type="triangle"/>
+          </a:ln>
+        </p:spPr>
+        <p:style>
+          <a:lnRef idx="3">
+            <a:schemeClr val="accent6"/>
+          </a:lnRef>
+          <a:fillRef idx="0">
+            <a:schemeClr val="accent6"/>
+          </a:fillRef>
+          <a:effectRef idx="2">
+            <a:schemeClr val="accent6"/>
+          </a:effectRef>
+          <a:fontRef idx="minor">
+            <a:schemeClr val="tx1"/>
+          </a:fontRef>
+        </p:style>
+      </p:cxnSp>
+      <p:cxnSp>
+        <p:nvCxnSpPr>
+          <p:cNvPr id="30" name="Straight Arrow Connector 29">
+            <a:extLst>
+              <a:ext uri="{FF2B5EF4-FFF2-40B4-BE49-F238E27FC236}">
+                <a16:creationId xmlns:a16="http://schemas.microsoft.com/office/drawing/2014/main" id="{5AEA644C-F459-4C32-B6A3-9F592634A47E}"/>
+              </a:ext>
+            </a:extLst>
+          </p:cNvPr>
+          <p:cNvCxnSpPr/>
+          <p:nvPr/>
+        </p:nvCxnSpPr>
+        <p:spPr>
+          <a:xfrm>
+            <a:off x="3418110" y="4894213"/>
+            <a:ext cx="383177" cy="0"/>
+          </a:xfrm>
+          <a:prstGeom prst="straightConnector1">
+            <a:avLst/>
+          </a:prstGeom>
+          <a:ln w="38100">
+            <a:tailEnd type="triangle"/>
+          </a:ln>
+        </p:spPr>
+        <p:style>
+          <a:lnRef idx="3">
+            <a:schemeClr val="accent6"/>
+          </a:lnRef>
+          <a:fillRef idx="0">
+            <a:schemeClr val="accent6"/>
+          </a:fillRef>
+          <a:effectRef idx="2">
+            <a:schemeClr val="accent6"/>
+          </a:effectRef>
+          <a:fontRef idx="minor">
+            <a:schemeClr val="tx1"/>
+          </a:fontRef>
+        </p:style>
+      </p:cxnSp>
+      <p:cxnSp>
+        <p:nvCxnSpPr>
+          <p:cNvPr id="31" name="Straight Arrow Connector 30">
+            <a:extLst>
+              <a:ext uri="{FF2B5EF4-FFF2-40B4-BE49-F238E27FC236}">
+                <a16:creationId xmlns:a16="http://schemas.microsoft.com/office/drawing/2014/main" id="{AC1A1FA3-2AF7-4310-9E18-EDE1498DEA20}"/>
+              </a:ext>
+            </a:extLst>
+          </p:cNvPr>
+          <p:cNvCxnSpPr/>
+          <p:nvPr/>
+        </p:nvCxnSpPr>
+        <p:spPr>
+          <a:xfrm>
+            <a:off x="3418110" y="5503825"/>
+            <a:ext cx="383177" cy="0"/>
+          </a:xfrm>
+          <a:prstGeom prst="straightConnector1">
+            <a:avLst/>
+          </a:prstGeom>
+          <a:ln w="38100">
+            <a:tailEnd type="triangle"/>
+          </a:ln>
+        </p:spPr>
+        <p:style>
+          <a:lnRef idx="3">
+            <a:schemeClr val="accent6"/>
+          </a:lnRef>
+          <a:fillRef idx="0">
+            <a:schemeClr val="accent6"/>
+          </a:fillRef>
+          <a:effectRef idx="2">
+            <a:schemeClr val="accent6"/>
+          </a:effectRef>
+          <a:fontRef idx="minor">
+            <a:schemeClr val="tx1"/>
+          </a:fontRef>
+        </p:style>
+      </p:cxnSp>
+      <p:cxnSp>
+        <p:nvCxnSpPr>
+          <p:cNvPr id="32" name="Straight Arrow Connector 31">
+            <a:extLst>
+              <a:ext uri="{FF2B5EF4-FFF2-40B4-BE49-F238E27FC236}">
+                <a16:creationId xmlns:a16="http://schemas.microsoft.com/office/drawing/2014/main" id="{E6643D18-09F6-4D10-9DB9-7A03414CC04A}"/>
+              </a:ext>
+            </a:extLst>
+          </p:cNvPr>
+          <p:cNvCxnSpPr/>
+          <p:nvPr/>
+        </p:nvCxnSpPr>
+        <p:spPr>
+          <a:xfrm>
+            <a:off x="3387635" y="6109061"/>
+            <a:ext cx="383177" cy="0"/>
+          </a:xfrm>
+          <a:prstGeom prst="straightConnector1">
+            <a:avLst/>
+          </a:prstGeom>
+          <a:ln w="38100">
+            <a:tailEnd type="triangle"/>
+          </a:ln>
+        </p:spPr>
+        <p:style>
+          <a:lnRef idx="3">
+            <a:schemeClr val="accent6"/>
+          </a:lnRef>
+          <a:fillRef idx="0">
+            <a:schemeClr val="accent6"/>
+          </a:fillRef>
+          <a:effectRef idx="2">
+            <a:schemeClr val="accent6"/>
+          </a:effectRef>
+          <a:fontRef idx="minor">
+            <a:schemeClr val="tx1"/>
+          </a:fontRef>
+        </p:style>
+      </p:cxnSp>
+      <p:cxnSp>
+        <p:nvCxnSpPr>
+          <p:cNvPr id="33" name="Straight Arrow Connector 32">
+            <a:extLst>
+              <a:ext uri="{FF2B5EF4-FFF2-40B4-BE49-F238E27FC236}">
+                <a16:creationId xmlns:a16="http://schemas.microsoft.com/office/drawing/2014/main" id="{8ACFF2A3-B1D7-4A4E-A1D0-0A8E95C1EA93}"/>
+              </a:ext>
+            </a:extLst>
+          </p:cNvPr>
+          <p:cNvCxnSpPr/>
+          <p:nvPr/>
+        </p:nvCxnSpPr>
+        <p:spPr>
+          <a:xfrm>
+            <a:off x="4598123" y="3091543"/>
+            <a:ext cx="383177" cy="0"/>
+          </a:xfrm>
+          <a:prstGeom prst="straightConnector1">
+            <a:avLst/>
+          </a:prstGeom>
+          <a:ln w="38100">
+            <a:tailEnd type="triangle"/>
+          </a:ln>
+        </p:spPr>
+        <p:style>
+          <a:lnRef idx="3">
+            <a:schemeClr val="accent6"/>
+          </a:lnRef>
+          <a:fillRef idx="0">
+            <a:schemeClr val="accent6"/>
+          </a:fillRef>
+          <a:effectRef idx="2">
+            <a:schemeClr val="accent6"/>
+          </a:effectRef>
+          <a:fontRef idx="minor">
+            <a:schemeClr val="tx1"/>
+          </a:fontRef>
+        </p:style>
+      </p:cxnSp>
+      <p:cxnSp>
+        <p:nvCxnSpPr>
+          <p:cNvPr id="34" name="Straight Arrow Connector 33">
+            <a:extLst>
+              <a:ext uri="{FF2B5EF4-FFF2-40B4-BE49-F238E27FC236}">
+                <a16:creationId xmlns:a16="http://schemas.microsoft.com/office/drawing/2014/main" id="{E7588493-8AF7-420E-B756-9FC5C5B4B7DF}"/>
+              </a:ext>
+            </a:extLst>
+          </p:cNvPr>
+          <p:cNvCxnSpPr/>
+          <p:nvPr/>
+        </p:nvCxnSpPr>
+        <p:spPr>
+          <a:xfrm>
+            <a:off x="4598123" y="2512407"/>
+            <a:ext cx="383177" cy="0"/>
+          </a:xfrm>
+          <a:prstGeom prst="straightConnector1">
+            <a:avLst/>
+          </a:prstGeom>
+          <a:ln w="38100">
+            <a:tailEnd type="triangle"/>
+          </a:ln>
+        </p:spPr>
+        <p:style>
+          <a:lnRef idx="3">
+            <a:schemeClr val="accent6"/>
+          </a:lnRef>
+          <a:fillRef idx="0">
+            <a:schemeClr val="accent6"/>
+          </a:fillRef>
+          <a:effectRef idx="2">
+            <a:schemeClr val="accent6"/>
+          </a:effectRef>
+          <a:fontRef idx="minor">
+            <a:schemeClr val="tx1"/>
+          </a:fontRef>
+        </p:style>
+      </p:cxnSp>
+      <p:cxnSp>
+        <p:nvCxnSpPr>
+          <p:cNvPr id="35" name="Straight Arrow Connector 34">
+            <a:extLst>
+              <a:ext uri="{FF2B5EF4-FFF2-40B4-BE49-F238E27FC236}">
+                <a16:creationId xmlns:a16="http://schemas.microsoft.com/office/drawing/2014/main" id="{4A26E0FE-2064-43EE-B882-408D95B537E9}"/>
+              </a:ext>
+            </a:extLst>
+          </p:cNvPr>
+          <p:cNvCxnSpPr/>
+          <p:nvPr/>
+        </p:nvCxnSpPr>
+        <p:spPr>
+          <a:xfrm>
+            <a:off x="4598123" y="1889760"/>
+            <a:ext cx="383177" cy="0"/>
+          </a:xfrm>
+          <a:prstGeom prst="straightConnector1">
+            <a:avLst/>
+          </a:prstGeom>
+          <a:ln w="38100">
+            <a:tailEnd type="triangle"/>
+          </a:ln>
+        </p:spPr>
+        <p:style>
+          <a:lnRef idx="3">
+            <a:schemeClr val="accent6"/>
+          </a:lnRef>
+          <a:fillRef idx="0">
+            <a:schemeClr val="accent6"/>
+          </a:fillRef>
+          <a:effectRef idx="2">
+            <a:schemeClr val="accent6"/>
+          </a:effectRef>
+          <a:fontRef idx="minor">
+            <a:schemeClr val="tx1"/>
+          </a:fontRef>
+        </p:style>
+      </p:cxnSp>
+      <p:cxnSp>
+        <p:nvCxnSpPr>
+          <p:cNvPr id="36" name="Straight Arrow Connector 35">
+            <a:extLst>
+              <a:ext uri="{FF2B5EF4-FFF2-40B4-BE49-F238E27FC236}">
+                <a16:creationId xmlns:a16="http://schemas.microsoft.com/office/drawing/2014/main" id="{3962CF3A-AC7F-489F-89E9-89C17DEBED07}"/>
+              </a:ext>
+            </a:extLst>
+          </p:cNvPr>
+          <p:cNvCxnSpPr/>
+          <p:nvPr/>
+        </p:nvCxnSpPr>
+        <p:spPr>
+          <a:xfrm>
+            <a:off x="4598123" y="1310618"/>
+            <a:ext cx="383177" cy="0"/>
+          </a:xfrm>
+          <a:prstGeom prst="straightConnector1">
+            <a:avLst/>
+          </a:prstGeom>
+          <a:ln w="38100">
+            <a:tailEnd type="triangle"/>
+          </a:ln>
+        </p:spPr>
+        <p:style>
+          <a:lnRef idx="3">
+            <a:schemeClr val="accent6"/>
+          </a:lnRef>
+          <a:fillRef idx="0">
+            <a:schemeClr val="accent6"/>
+          </a:fillRef>
+          <a:effectRef idx="2">
+            <a:schemeClr val="accent6"/>
+          </a:effectRef>
+          <a:fontRef idx="minor">
+            <a:schemeClr val="tx1"/>
+          </a:fontRef>
+        </p:style>
+      </p:cxnSp>
+      <p:cxnSp>
+        <p:nvCxnSpPr>
+          <p:cNvPr id="37" name="Straight Arrow Connector 36">
+            <a:extLst>
+              <a:ext uri="{FF2B5EF4-FFF2-40B4-BE49-F238E27FC236}">
+                <a16:creationId xmlns:a16="http://schemas.microsoft.com/office/drawing/2014/main" id="{71EC0952-EB01-44A8-95D3-0A970C5BA1AB}"/>
+              </a:ext>
+            </a:extLst>
+          </p:cNvPr>
+          <p:cNvCxnSpPr/>
+          <p:nvPr/>
+        </p:nvCxnSpPr>
+        <p:spPr>
+          <a:xfrm>
+            <a:off x="4598123" y="692326"/>
+            <a:ext cx="383177" cy="0"/>
+          </a:xfrm>
+          <a:prstGeom prst="straightConnector1">
+            <a:avLst/>
+          </a:prstGeom>
+          <a:ln w="38100">
+            <a:tailEnd type="triangle"/>
+          </a:ln>
+        </p:spPr>
+        <p:style>
+          <a:lnRef idx="3">
+            <a:schemeClr val="accent6"/>
+          </a:lnRef>
+          <a:fillRef idx="0">
+            <a:schemeClr val="accent6"/>
+          </a:fillRef>
+          <a:effectRef idx="2">
+            <a:schemeClr val="accent6"/>
+          </a:effectRef>
+          <a:fontRef idx="minor">
+            <a:schemeClr val="tx1"/>
+          </a:fontRef>
+        </p:style>
+      </p:cxnSp>
+      <p:cxnSp>
+        <p:nvCxnSpPr>
+          <p:cNvPr id="38" name="Straight Arrow Connector 37">
+            <a:extLst>
+              <a:ext uri="{FF2B5EF4-FFF2-40B4-BE49-F238E27FC236}">
+                <a16:creationId xmlns:a16="http://schemas.microsoft.com/office/drawing/2014/main" id="{C2FCBE51-31A4-4709-9E3F-F544593925B8}"/>
+              </a:ext>
+            </a:extLst>
+          </p:cNvPr>
+          <p:cNvCxnSpPr/>
+          <p:nvPr/>
+        </p:nvCxnSpPr>
+        <p:spPr>
+          <a:xfrm>
+            <a:off x="4598123" y="4302037"/>
+            <a:ext cx="383177" cy="0"/>
+          </a:xfrm>
+          <a:prstGeom prst="straightConnector1">
+            <a:avLst/>
+          </a:prstGeom>
+          <a:ln w="38100">
+            <a:tailEnd type="triangle"/>
+          </a:ln>
+        </p:spPr>
+        <p:style>
+          <a:lnRef idx="3">
+            <a:schemeClr val="accent6"/>
+          </a:lnRef>
+          <a:fillRef idx="0">
+            <a:schemeClr val="accent6"/>
+          </a:fillRef>
+          <a:effectRef idx="2">
+            <a:schemeClr val="accent6"/>
+          </a:effectRef>
+          <a:fontRef idx="minor">
+            <a:schemeClr val="tx1"/>
+          </a:fontRef>
+        </p:style>
+      </p:cxnSp>
+      <p:cxnSp>
+        <p:nvCxnSpPr>
+          <p:cNvPr id="39" name="Straight Arrow Connector 38">
+            <a:extLst>
+              <a:ext uri="{FF2B5EF4-FFF2-40B4-BE49-F238E27FC236}">
+                <a16:creationId xmlns:a16="http://schemas.microsoft.com/office/drawing/2014/main" id="{DA2CCB44-304D-4BF7-A00F-DD75B092EC23}"/>
+              </a:ext>
+            </a:extLst>
+          </p:cNvPr>
+          <p:cNvCxnSpPr/>
+          <p:nvPr/>
+        </p:nvCxnSpPr>
+        <p:spPr>
+          <a:xfrm>
+            <a:off x="4598123" y="4894213"/>
+            <a:ext cx="383177" cy="0"/>
+          </a:xfrm>
+          <a:prstGeom prst="straightConnector1">
+            <a:avLst/>
+          </a:prstGeom>
+          <a:ln w="38100">
+            <a:tailEnd type="triangle"/>
+          </a:ln>
+        </p:spPr>
+        <p:style>
+          <a:lnRef idx="3">
+            <a:schemeClr val="accent6"/>
+          </a:lnRef>
+          <a:fillRef idx="0">
+            <a:schemeClr val="accent6"/>
+          </a:fillRef>
+          <a:effectRef idx="2">
+            <a:schemeClr val="accent6"/>
+          </a:effectRef>
+          <a:fontRef idx="minor">
+            <a:schemeClr val="tx1"/>
+          </a:fontRef>
+        </p:style>
+      </p:cxnSp>
+      <p:cxnSp>
+        <p:nvCxnSpPr>
+          <p:cNvPr id="40" name="Straight Arrow Connector 39">
+            <a:extLst>
+              <a:ext uri="{FF2B5EF4-FFF2-40B4-BE49-F238E27FC236}">
+                <a16:creationId xmlns:a16="http://schemas.microsoft.com/office/drawing/2014/main" id="{FB1C6E8C-7729-404A-A7A8-340BB0BF1770}"/>
+              </a:ext>
+            </a:extLst>
+          </p:cNvPr>
+          <p:cNvCxnSpPr/>
+          <p:nvPr/>
+        </p:nvCxnSpPr>
+        <p:spPr>
+          <a:xfrm>
+            <a:off x="4598123" y="5503825"/>
+            <a:ext cx="383177" cy="0"/>
+          </a:xfrm>
+          <a:prstGeom prst="straightConnector1">
+            <a:avLst/>
+          </a:prstGeom>
+          <a:ln w="38100">
+            <a:tailEnd type="triangle"/>
+          </a:ln>
+        </p:spPr>
+        <p:style>
+          <a:lnRef idx="3">
+            <a:schemeClr val="accent6"/>
+          </a:lnRef>
+          <a:fillRef idx="0">
+            <a:schemeClr val="accent6"/>
+          </a:fillRef>
+          <a:effectRef idx="2">
+            <a:schemeClr val="accent6"/>
+          </a:effectRef>
+          <a:fontRef idx="minor">
+            <a:schemeClr val="tx1"/>
+          </a:fontRef>
+        </p:style>
+      </p:cxnSp>
+      <p:cxnSp>
+        <p:nvCxnSpPr>
+          <p:cNvPr id="41" name="Straight Arrow Connector 40">
+            <a:extLst>
+              <a:ext uri="{FF2B5EF4-FFF2-40B4-BE49-F238E27FC236}">
+                <a16:creationId xmlns:a16="http://schemas.microsoft.com/office/drawing/2014/main" id="{69D8F794-9779-4630-98BA-EC47B87E9E8F}"/>
+              </a:ext>
+            </a:extLst>
+          </p:cNvPr>
+          <p:cNvCxnSpPr/>
+          <p:nvPr/>
+        </p:nvCxnSpPr>
+        <p:spPr>
+          <a:xfrm>
+            <a:off x="4598123" y="6109061"/>
+            <a:ext cx="383177" cy="0"/>
+          </a:xfrm>
+          <a:prstGeom prst="straightConnector1">
+            <a:avLst/>
+          </a:prstGeom>
+          <a:ln w="38100">
+            <a:tailEnd type="triangle"/>
+          </a:ln>
+        </p:spPr>
+        <p:style>
+          <a:lnRef idx="3">
+            <a:schemeClr val="accent6"/>
+          </a:lnRef>
+          <a:fillRef idx="0">
+            <a:schemeClr val="accent6"/>
+          </a:fillRef>
+          <a:effectRef idx="2">
+            <a:schemeClr val="accent6"/>
+          </a:effectRef>
+          <a:fontRef idx="minor">
+            <a:schemeClr val="tx1"/>
+          </a:fontRef>
+        </p:style>
+      </p:cxnSp>
+      <p:cxnSp>
+        <p:nvCxnSpPr>
+          <p:cNvPr id="42" name="Straight Arrow Connector 41">
+            <a:extLst>
+              <a:ext uri="{FF2B5EF4-FFF2-40B4-BE49-F238E27FC236}">
+                <a16:creationId xmlns:a16="http://schemas.microsoft.com/office/drawing/2014/main" id="{F9B2C372-0613-46F8-A91C-9585E511E0D8}"/>
+              </a:ext>
+            </a:extLst>
+          </p:cNvPr>
+          <p:cNvCxnSpPr/>
+          <p:nvPr/>
+        </p:nvCxnSpPr>
+        <p:spPr>
+          <a:xfrm>
+            <a:off x="5199021" y="692326"/>
+            <a:ext cx="383177" cy="0"/>
+          </a:xfrm>
+          <a:prstGeom prst="straightConnector1">
+            <a:avLst/>
+          </a:prstGeom>
+          <a:ln w="38100">
+            <a:tailEnd type="triangle"/>
+          </a:ln>
+        </p:spPr>
+        <p:style>
+          <a:lnRef idx="3">
+            <a:schemeClr val="accent6"/>
+          </a:lnRef>
+          <a:fillRef idx="0">
+            <a:schemeClr val="accent6"/>
+          </a:fillRef>
+          <a:effectRef idx="2">
+            <a:schemeClr val="accent6"/>
+          </a:effectRef>
+          <a:fontRef idx="minor">
+            <a:schemeClr val="tx1"/>
+          </a:fontRef>
+        </p:style>
+      </p:cxnSp>
+      <p:cxnSp>
+        <p:nvCxnSpPr>
+          <p:cNvPr id="43" name="Straight Arrow Connector 42">
+            <a:extLst>
+              <a:ext uri="{FF2B5EF4-FFF2-40B4-BE49-F238E27FC236}">
+                <a16:creationId xmlns:a16="http://schemas.microsoft.com/office/drawing/2014/main" id="{114E939A-F404-4149-BBA8-B73920B87163}"/>
+              </a:ext>
+            </a:extLst>
+          </p:cNvPr>
+          <p:cNvCxnSpPr/>
+          <p:nvPr/>
+        </p:nvCxnSpPr>
+        <p:spPr>
+          <a:xfrm>
+            <a:off x="5199021" y="1310618"/>
+            <a:ext cx="383177" cy="0"/>
+          </a:xfrm>
+          <a:prstGeom prst="straightConnector1">
+            <a:avLst/>
+          </a:prstGeom>
+          <a:ln w="38100">
+            <a:tailEnd type="triangle"/>
+          </a:ln>
+        </p:spPr>
+        <p:style>
+          <a:lnRef idx="3">
+            <a:schemeClr val="accent6"/>
+          </a:lnRef>
+          <a:fillRef idx="0">
+            <a:schemeClr val="accent6"/>
+          </a:fillRef>
+          <a:effectRef idx="2">
+            <a:schemeClr val="accent6"/>
+          </a:effectRef>
+          <a:fontRef idx="minor">
+            <a:schemeClr val="tx1"/>
+          </a:fontRef>
+        </p:style>
+      </p:cxnSp>
+      <p:cxnSp>
+        <p:nvCxnSpPr>
+          <p:cNvPr id="44" name="Straight Arrow Connector 43">
+            <a:extLst>
+              <a:ext uri="{FF2B5EF4-FFF2-40B4-BE49-F238E27FC236}">
+                <a16:creationId xmlns:a16="http://schemas.microsoft.com/office/drawing/2014/main" id="{5D0CD2D2-C888-4F3C-A931-BAAB304536B6}"/>
+              </a:ext>
+            </a:extLst>
+          </p:cNvPr>
+          <p:cNvCxnSpPr/>
+          <p:nvPr/>
+        </p:nvCxnSpPr>
+        <p:spPr>
+          <a:xfrm>
+            <a:off x="5199021" y="1911523"/>
+            <a:ext cx="383177" cy="0"/>
+          </a:xfrm>
+          <a:prstGeom prst="straightConnector1">
+            <a:avLst/>
+          </a:prstGeom>
+          <a:ln w="38100">
+            <a:tailEnd type="triangle"/>
+          </a:ln>
+        </p:spPr>
+        <p:style>
+          <a:lnRef idx="3">
+            <a:schemeClr val="accent6"/>
+          </a:lnRef>
+          <a:fillRef idx="0">
+            <a:schemeClr val="accent6"/>
+          </a:fillRef>
+          <a:effectRef idx="2">
+            <a:schemeClr val="accent6"/>
+          </a:effectRef>
+          <a:fontRef idx="minor">
+            <a:schemeClr val="tx1"/>
+          </a:fontRef>
+        </p:style>
+      </p:cxnSp>
+      <p:cxnSp>
+        <p:nvCxnSpPr>
+          <p:cNvPr id="45" name="Straight Arrow Connector 44">
+            <a:extLst>
+              <a:ext uri="{FF2B5EF4-FFF2-40B4-BE49-F238E27FC236}">
+                <a16:creationId xmlns:a16="http://schemas.microsoft.com/office/drawing/2014/main" id="{24F49555-FB24-4813-8F5F-9B203A23B26C}"/>
+              </a:ext>
+            </a:extLst>
+          </p:cNvPr>
+          <p:cNvCxnSpPr/>
+          <p:nvPr/>
+        </p:nvCxnSpPr>
+        <p:spPr>
+          <a:xfrm>
+            <a:off x="5199021" y="2508061"/>
+            <a:ext cx="383177" cy="0"/>
+          </a:xfrm>
+          <a:prstGeom prst="straightConnector1">
+            <a:avLst/>
+          </a:prstGeom>
+          <a:ln w="38100">
+            <a:tailEnd type="triangle"/>
+          </a:ln>
+        </p:spPr>
+        <p:style>
+          <a:lnRef idx="3">
+            <a:schemeClr val="accent6"/>
+          </a:lnRef>
+          <a:fillRef idx="0">
+            <a:schemeClr val="accent6"/>
+          </a:fillRef>
+          <a:effectRef idx="2">
+            <a:schemeClr val="accent6"/>
+          </a:effectRef>
+          <a:fontRef idx="minor">
+            <a:schemeClr val="tx1"/>
+          </a:fontRef>
+        </p:style>
+      </p:cxnSp>
+      <p:cxnSp>
+        <p:nvCxnSpPr>
+          <p:cNvPr id="46" name="Straight Arrow Connector 45">
+            <a:extLst>
+              <a:ext uri="{FF2B5EF4-FFF2-40B4-BE49-F238E27FC236}">
+                <a16:creationId xmlns:a16="http://schemas.microsoft.com/office/drawing/2014/main" id="{67C2C01C-EB60-4602-B9B0-D548D0F18284}"/>
+              </a:ext>
+            </a:extLst>
+          </p:cNvPr>
+          <p:cNvCxnSpPr/>
+          <p:nvPr/>
+        </p:nvCxnSpPr>
+        <p:spPr>
+          <a:xfrm>
+            <a:off x="5199021" y="3087172"/>
+            <a:ext cx="383177" cy="0"/>
+          </a:xfrm>
+          <a:prstGeom prst="straightConnector1">
+            <a:avLst/>
+          </a:prstGeom>
+          <a:ln w="38100">
+            <a:tailEnd type="triangle"/>
+          </a:ln>
+        </p:spPr>
+        <p:style>
+          <a:lnRef idx="3">
+            <a:schemeClr val="accent6"/>
+          </a:lnRef>
+          <a:fillRef idx="0">
+            <a:schemeClr val="accent6"/>
+          </a:fillRef>
+          <a:effectRef idx="2">
+            <a:schemeClr val="accent6"/>
+          </a:effectRef>
+          <a:fontRef idx="minor">
+            <a:schemeClr val="tx1"/>
+          </a:fontRef>
+        </p:style>
+      </p:cxnSp>
+      <p:cxnSp>
+        <p:nvCxnSpPr>
+          <p:cNvPr id="47" name="Straight Arrow Connector 46">
+            <a:extLst>
+              <a:ext uri="{FF2B5EF4-FFF2-40B4-BE49-F238E27FC236}">
+                <a16:creationId xmlns:a16="http://schemas.microsoft.com/office/drawing/2014/main" id="{D44AAEB2-E7B6-4C8D-864D-01453A7D2625}"/>
+              </a:ext>
+            </a:extLst>
+          </p:cNvPr>
+          <p:cNvCxnSpPr/>
+          <p:nvPr/>
+        </p:nvCxnSpPr>
+        <p:spPr>
+          <a:xfrm>
+            <a:off x="5199021" y="4302037"/>
+            <a:ext cx="383177" cy="0"/>
+          </a:xfrm>
+          <a:prstGeom prst="straightConnector1">
+            <a:avLst/>
+          </a:prstGeom>
+          <a:ln w="38100">
+            <a:tailEnd type="triangle"/>
+          </a:ln>
+        </p:spPr>
+        <p:style>
+          <a:lnRef idx="3">
+            <a:schemeClr val="accent6"/>
+          </a:lnRef>
+          <a:fillRef idx="0">
+            <a:schemeClr val="accent6"/>
+          </a:fillRef>
+          <a:effectRef idx="2">
+            <a:schemeClr val="accent6"/>
+          </a:effectRef>
+          <a:fontRef idx="minor">
+            <a:schemeClr val="tx1"/>
+          </a:fontRef>
+        </p:style>
+      </p:cxnSp>
+      <p:cxnSp>
+        <p:nvCxnSpPr>
+          <p:cNvPr id="48" name="Straight Arrow Connector 47">
+            <a:extLst>
+              <a:ext uri="{FF2B5EF4-FFF2-40B4-BE49-F238E27FC236}">
+                <a16:creationId xmlns:a16="http://schemas.microsoft.com/office/drawing/2014/main" id="{3CA91FD6-B643-411C-BB6A-E203C43DF26F}"/>
+              </a:ext>
+            </a:extLst>
+          </p:cNvPr>
+          <p:cNvCxnSpPr/>
+          <p:nvPr/>
+        </p:nvCxnSpPr>
+        <p:spPr>
+          <a:xfrm>
+            <a:off x="5199021" y="4898559"/>
+            <a:ext cx="383177" cy="0"/>
+          </a:xfrm>
+          <a:prstGeom prst="straightConnector1">
+            <a:avLst/>
+          </a:prstGeom>
+          <a:ln w="38100">
+            <a:tailEnd type="triangle"/>
+          </a:ln>
+        </p:spPr>
+        <p:style>
+          <a:lnRef idx="3">
+            <a:schemeClr val="accent6"/>
+          </a:lnRef>
+          <a:fillRef idx="0">
+            <a:schemeClr val="accent6"/>
+          </a:fillRef>
+          <a:effectRef idx="2">
+            <a:schemeClr val="accent6"/>
+          </a:effectRef>
+          <a:fontRef idx="minor">
+            <a:schemeClr val="tx1"/>
+          </a:fontRef>
+        </p:style>
+      </p:cxnSp>
+      <p:cxnSp>
+        <p:nvCxnSpPr>
+          <p:cNvPr id="49" name="Straight Arrow Connector 48">
+            <a:extLst>
+              <a:ext uri="{FF2B5EF4-FFF2-40B4-BE49-F238E27FC236}">
+                <a16:creationId xmlns:a16="http://schemas.microsoft.com/office/drawing/2014/main" id="{5C432109-3A84-41BB-A83F-79F81779C5B7}"/>
+              </a:ext>
+            </a:extLst>
+          </p:cNvPr>
+          <p:cNvCxnSpPr/>
+          <p:nvPr/>
+        </p:nvCxnSpPr>
+        <p:spPr>
+          <a:xfrm>
+            <a:off x="5199021" y="5525588"/>
+            <a:ext cx="383177" cy="0"/>
+          </a:xfrm>
+          <a:prstGeom prst="straightConnector1">
+            <a:avLst/>
+          </a:prstGeom>
+          <a:ln w="38100">
+            <a:tailEnd type="triangle"/>
+          </a:ln>
+        </p:spPr>
+        <p:style>
+          <a:lnRef idx="3">
+            <a:schemeClr val="accent6"/>
+          </a:lnRef>
+          <a:fillRef idx="0">
+            <a:schemeClr val="accent6"/>
+          </a:fillRef>
+          <a:effectRef idx="2">
+            <a:schemeClr val="accent6"/>
+          </a:effectRef>
+          <a:fontRef idx="minor">
+            <a:schemeClr val="tx1"/>
+          </a:fontRef>
+        </p:style>
+      </p:cxnSp>
+      <p:cxnSp>
+        <p:nvCxnSpPr>
+          <p:cNvPr id="50" name="Straight Arrow Connector 49">
+            <a:extLst>
+              <a:ext uri="{FF2B5EF4-FFF2-40B4-BE49-F238E27FC236}">
+                <a16:creationId xmlns:a16="http://schemas.microsoft.com/office/drawing/2014/main" id="{CB5A6BAB-8F9E-44C0-8F8A-7469170C078E}"/>
+              </a:ext>
+            </a:extLst>
+          </p:cNvPr>
+          <p:cNvCxnSpPr/>
+          <p:nvPr/>
+        </p:nvCxnSpPr>
+        <p:spPr>
+          <a:xfrm>
+            <a:off x="5199021" y="6109061"/>
+            <a:ext cx="383177" cy="0"/>
+          </a:xfrm>
+          <a:prstGeom prst="straightConnector1">
+            <a:avLst/>
+          </a:prstGeom>
+          <a:ln w="38100">
+            <a:tailEnd type="triangle"/>
+          </a:ln>
+        </p:spPr>
+        <p:style>
+          <a:lnRef idx="3">
+            <a:schemeClr val="accent6"/>
+          </a:lnRef>
+          <a:fillRef idx="0">
+            <a:schemeClr val="accent6"/>
+          </a:fillRef>
+          <a:effectRef idx="2">
+            <a:schemeClr val="accent6"/>
+          </a:effectRef>
+          <a:fontRef idx="minor">
+            <a:schemeClr val="tx1"/>
+          </a:fontRef>
+        </p:style>
+      </p:cxnSp>
+      <p:cxnSp>
+        <p:nvCxnSpPr>
+          <p:cNvPr id="51" name="Straight Arrow Connector 50">
+            <a:extLst>
+              <a:ext uri="{FF2B5EF4-FFF2-40B4-BE49-F238E27FC236}">
+                <a16:creationId xmlns:a16="http://schemas.microsoft.com/office/drawing/2014/main" id="{F02F3DA1-8BF8-4E58-8D87-7441B6DE5F88}"/>
+              </a:ext>
+            </a:extLst>
+          </p:cNvPr>
+          <p:cNvCxnSpPr>
+            <a:cxnSpLocks/>
+          </p:cNvCxnSpPr>
+          <p:nvPr/>
+        </p:nvCxnSpPr>
+        <p:spPr>
+          <a:xfrm>
+            <a:off x="8982892" y="489856"/>
+            <a:ext cx="0" cy="404940"/>
+          </a:xfrm>
+          <a:prstGeom prst="straightConnector1">
+            <a:avLst/>
+          </a:prstGeom>
+          <a:ln w="38100">
+            <a:tailEnd type="triangle"/>
+          </a:ln>
+        </p:spPr>
+        <p:style>
+          <a:lnRef idx="3">
+            <a:schemeClr val="accent6"/>
+          </a:lnRef>
+          <a:fillRef idx="0">
+            <a:schemeClr val="accent6"/>
+          </a:fillRef>
+          <a:effectRef idx="2">
+            <a:schemeClr val="accent6"/>
+          </a:effectRef>
+          <a:fontRef idx="minor">
+            <a:schemeClr val="tx1"/>
+          </a:fontRef>
+        </p:style>
+      </p:cxnSp>
+      <p:cxnSp>
+        <p:nvCxnSpPr>
+          <p:cNvPr id="54" name="Straight Arrow Connector 53">
+            <a:extLst>
+              <a:ext uri="{FF2B5EF4-FFF2-40B4-BE49-F238E27FC236}">
+                <a16:creationId xmlns:a16="http://schemas.microsoft.com/office/drawing/2014/main" id="{E0352EF5-85F8-4D57-8044-72E8B07CB180}"/>
+              </a:ext>
+            </a:extLst>
+          </p:cNvPr>
+          <p:cNvCxnSpPr>
+            <a:cxnSpLocks/>
+          </p:cNvCxnSpPr>
+          <p:nvPr/>
+        </p:nvCxnSpPr>
+        <p:spPr>
+          <a:xfrm>
+            <a:off x="8982892" y="1086385"/>
+            <a:ext cx="0" cy="404940"/>
+          </a:xfrm>
+          <a:prstGeom prst="straightConnector1">
+            <a:avLst/>
+          </a:prstGeom>
+          <a:ln w="38100">
+            <a:tailEnd type="triangle"/>
+          </a:ln>
+        </p:spPr>
+        <p:style>
+          <a:lnRef idx="3">
+            <a:schemeClr val="accent6"/>
+          </a:lnRef>
+          <a:fillRef idx="0">
+            <a:schemeClr val="accent6"/>
+          </a:fillRef>
+          <a:effectRef idx="2">
+            <a:schemeClr val="accent6"/>
+          </a:effectRef>
+          <a:fontRef idx="minor">
+            <a:schemeClr val="tx1"/>
+          </a:fontRef>
+        </p:style>
+      </p:cxnSp>
+      <p:cxnSp>
+        <p:nvCxnSpPr>
+          <p:cNvPr id="55" name="Straight Arrow Connector 54">
+            <a:extLst>
+              <a:ext uri="{FF2B5EF4-FFF2-40B4-BE49-F238E27FC236}">
+                <a16:creationId xmlns:a16="http://schemas.microsoft.com/office/drawing/2014/main" id="{8B875A2E-12F7-4AC3-A881-7F8F0BA8CA3A}"/>
+              </a:ext>
+            </a:extLst>
+          </p:cNvPr>
+          <p:cNvCxnSpPr>
+            <a:cxnSpLocks/>
+          </p:cNvCxnSpPr>
+          <p:nvPr/>
+        </p:nvCxnSpPr>
+        <p:spPr>
+          <a:xfrm>
+            <a:off x="8982892" y="1687290"/>
+            <a:ext cx="0" cy="404940"/>
+          </a:xfrm>
+          <a:prstGeom prst="straightConnector1">
+            <a:avLst/>
+          </a:prstGeom>
+          <a:ln w="38100">
+            <a:tailEnd type="triangle"/>
+          </a:ln>
+        </p:spPr>
+        <p:style>
+          <a:lnRef idx="3">
+            <a:schemeClr val="accent6"/>
+          </a:lnRef>
+          <a:fillRef idx="0">
+            <a:schemeClr val="accent6"/>
+          </a:fillRef>
+          <a:effectRef idx="2">
+            <a:schemeClr val="accent6"/>
+          </a:effectRef>
+          <a:fontRef idx="minor">
+            <a:schemeClr val="tx1"/>
+          </a:fontRef>
+        </p:style>
+      </p:cxnSp>
+      <p:cxnSp>
+        <p:nvCxnSpPr>
+          <p:cNvPr id="56" name="Straight Arrow Connector 55">
+            <a:extLst>
+              <a:ext uri="{FF2B5EF4-FFF2-40B4-BE49-F238E27FC236}">
+                <a16:creationId xmlns:a16="http://schemas.microsoft.com/office/drawing/2014/main" id="{4F70D584-F635-491F-AFBC-F8A8C05A5604}"/>
+              </a:ext>
+            </a:extLst>
+          </p:cNvPr>
+          <p:cNvCxnSpPr>
+            <a:cxnSpLocks/>
+          </p:cNvCxnSpPr>
+          <p:nvPr/>
+        </p:nvCxnSpPr>
+        <p:spPr>
+          <a:xfrm>
+            <a:off x="8982892" y="2283812"/>
+            <a:ext cx="0" cy="404940"/>
+          </a:xfrm>
+          <a:prstGeom prst="straightConnector1">
+            <a:avLst/>
+          </a:prstGeom>
+          <a:ln w="38100">
+            <a:tailEnd type="triangle"/>
+          </a:ln>
+        </p:spPr>
+        <p:style>
+          <a:lnRef idx="3">
+            <a:schemeClr val="accent6"/>
+          </a:lnRef>
+          <a:fillRef idx="0">
+            <a:schemeClr val="accent6"/>
+          </a:fillRef>
+          <a:effectRef idx="2">
+            <a:schemeClr val="accent6"/>
+          </a:effectRef>
+          <a:fontRef idx="minor">
+            <a:schemeClr val="tx1"/>
+          </a:fontRef>
+        </p:style>
+      </p:cxnSp>
+      <p:cxnSp>
+        <p:nvCxnSpPr>
+          <p:cNvPr id="57" name="Straight Arrow Connector 56">
+            <a:extLst>
+              <a:ext uri="{FF2B5EF4-FFF2-40B4-BE49-F238E27FC236}">
+                <a16:creationId xmlns:a16="http://schemas.microsoft.com/office/drawing/2014/main" id="{CFD6F494-7D6C-4979-852B-5A9C8200AE1A}"/>
+              </a:ext>
+            </a:extLst>
+          </p:cNvPr>
+          <p:cNvCxnSpPr>
+            <a:cxnSpLocks/>
+          </p:cNvCxnSpPr>
+          <p:nvPr/>
+        </p:nvCxnSpPr>
+        <p:spPr>
+          <a:xfrm>
+            <a:off x="8982892" y="2884702"/>
+            <a:ext cx="0" cy="404940"/>
+          </a:xfrm>
+          <a:prstGeom prst="straightConnector1">
+            <a:avLst/>
+          </a:prstGeom>
+          <a:ln w="38100">
+            <a:tailEnd type="triangle"/>
+          </a:ln>
+        </p:spPr>
+        <p:style>
+          <a:lnRef idx="3">
+            <a:schemeClr val="accent6"/>
+          </a:lnRef>
+          <a:fillRef idx="0">
+            <a:schemeClr val="accent6"/>
+          </a:fillRef>
+          <a:effectRef idx="2">
+            <a:schemeClr val="accent6"/>
+          </a:effectRef>
+          <a:fontRef idx="minor">
+            <a:schemeClr val="tx1"/>
+          </a:fontRef>
+        </p:style>
+      </p:cxnSp>
+      <p:cxnSp>
+        <p:nvCxnSpPr>
+          <p:cNvPr id="62" name="Straight Arrow Connector 61">
+            <a:extLst>
+              <a:ext uri="{FF2B5EF4-FFF2-40B4-BE49-F238E27FC236}">
+                <a16:creationId xmlns:a16="http://schemas.microsoft.com/office/drawing/2014/main" id="{88219CFA-739C-4BB3-9C42-2832FE1CFC3C}"/>
+              </a:ext>
+            </a:extLst>
+          </p:cNvPr>
+          <p:cNvCxnSpPr>
+            <a:cxnSpLocks/>
+          </p:cNvCxnSpPr>
+          <p:nvPr/>
+        </p:nvCxnSpPr>
+        <p:spPr>
+          <a:xfrm>
+            <a:off x="8395063" y="502915"/>
+            <a:ext cx="0" cy="404940"/>
+          </a:xfrm>
+          <a:prstGeom prst="straightConnector1">
+            <a:avLst/>
+          </a:prstGeom>
+          <a:ln w="38100">
+            <a:tailEnd type="triangle"/>
+          </a:ln>
+        </p:spPr>
+        <p:style>
+          <a:lnRef idx="3">
+            <a:schemeClr val="accent6"/>
+          </a:lnRef>
+          <a:fillRef idx="0">
+            <a:schemeClr val="accent6"/>
+          </a:fillRef>
+          <a:effectRef idx="2">
+            <a:schemeClr val="accent6"/>
+          </a:effectRef>
+          <a:fontRef idx="minor">
+            <a:schemeClr val="tx1"/>
+          </a:fontRef>
+        </p:style>
+      </p:cxnSp>
+      <p:cxnSp>
+        <p:nvCxnSpPr>
+          <p:cNvPr id="63" name="Straight Arrow Connector 62">
+            <a:extLst>
+              <a:ext uri="{FF2B5EF4-FFF2-40B4-BE49-F238E27FC236}">
+                <a16:creationId xmlns:a16="http://schemas.microsoft.com/office/drawing/2014/main" id="{4CF2CDCE-0ECE-491D-A253-E9EE9D9E1B18}"/>
+              </a:ext>
+            </a:extLst>
+          </p:cNvPr>
+          <p:cNvCxnSpPr>
+            <a:cxnSpLocks/>
+          </p:cNvCxnSpPr>
+          <p:nvPr/>
+        </p:nvCxnSpPr>
+        <p:spPr>
+          <a:xfrm>
+            <a:off x="8395063" y="1099444"/>
+            <a:ext cx="0" cy="404940"/>
+          </a:xfrm>
+          <a:prstGeom prst="straightConnector1">
+            <a:avLst/>
+          </a:prstGeom>
+          <a:ln w="38100">
+            <a:tailEnd type="triangle"/>
+          </a:ln>
+        </p:spPr>
+        <p:style>
+          <a:lnRef idx="3">
+            <a:schemeClr val="accent6"/>
+          </a:lnRef>
+          <a:fillRef idx="0">
+            <a:schemeClr val="accent6"/>
+          </a:fillRef>
+          <a:effectRef idx="2">
+            <a:schemeClr val="accent6"/>
+          </a:effectRef>
+          <a:fontRef idx="minor">
+            <a:schemeClr val="tx1"/>
+          </a:fontRef>
+        </p:style>
+      </p:cxnSp>
+      <p:cxnSp>
+        <p:nvCxnSpPr>
+          <p:cNvPr id="64" name="Straight Arrow Connector 63">
+            <a:extLst>
+              <a:ext uri="{FF2B5EF4-FFF2-40B4-BE49-F238E27FC236}">
+                <a16:creationId xmlns:a16="http://schemas.microsoft.com/office/drawing/2014/main" id="{1D0DED35-EF01-4E3F-BEBB-CB40916F1EC5}"/>
+              </a:ext>
+            </a:extLst>
+          </p:cNvPr>
+          <p:cNvCxnSpPr>
+            <a:cxnSpLocks/>
+          </p:cNvCxnSpPr>
+          <p:nvPr/>
+        </p:nvCxnSpPr>
+        <p:spPr>
+          <a:xfrm>
+            <a:off x="8395063" y="1700349"/>
+            <a:ext cx="0" cy="404940"/>
+          </a:xfrm>
+          <a:prstGeom prst="straightConnector1">
+            <a:avLst/>
+          </a:prstGeom>
+          <a:ln w="38100">
+            <a:tailEnd type="triangle"/>
+          </a:ln>
+        </p:spPr>
+        <p:style>
+          <a:lnRef idx="3">
+            <a:schemeClr val="accent6"/>
+          </a:lnRef>
+          <a:fillRef idx="0">
+            <a:schemeClr val="accent6"/>
+          </a:fillRef>
+          <a:effectRef idx="2">
+            <a:schemeClr val="accent6"/>
+          </a:effectRef>
+          <a:fontRef idx="minor">
+            <a:schemeClr val="tx1"/>
+          </a:fontRef>
+        </p:style>
+      </p:cxnSp>
+      <p:cxnSp>
+        <p:nvCxnSpPr>
+          <p:cNvPr id="65" name="Straight Arrow Connector 64">
+            <a:extLst>
+              <a:ext uri="{FF2B5EF4-FFF2-40B4-BE49-F238E27FC236}">
+                <a16:creationId xmlns:a16="http://schemas.microsoft.com/office/drawing/2014/main" id="{DB69EA73-5E51-40B1-A96D-8B4B3098C8D2}"/>
+              </a:ext>
+            </a:extLst>
+          </p:cNvPr>
+          <p:cNvCxnSpPr>
+            <a:cxnSpLocks/>
+          </p:cNvCxnSpPr>
+          <p:nvPr/>
+        </p:nvCxnSpPr>
+        <p:spPr>
+          <a:xfrm>
+            <a:off x="8395063" y="2296871"/>
+            <a:ext cx="0" cy="404940"/>
+          </a:xfrm>
+          <a:prstGeom prst="straightConnector1">
+            <a:avLst/>
+          </a:prstGeom>
+          <a:ln w="38100">
+            <a:tailEnd type="triangle"/>
+          </a:ln>
+        </p:spPr>
+        <p:style>
+          <a:lnRef idx="3">
+            <a:schemeClr val="accent6"/>
+          </a:lnRef>
+          <a:fillRef idx="0">
+            <a:schemeClr val="accent6"/>
+          </a:fillRef>
+          <a:effectRef idx="2">
+            <a:schemeClr val="accent6"/>
+          </a:effectRef>
+          <a:fontRef idx="minor">
+            <a:schemeClr val="tx1"/>
+          </a:fontRef>
+        </p:style>
+      </p:cxnSp>
+      <p:cxnSp>
+        <p:nvCxnSpPr>
+          <p:cNvPr id="66" name="Straight Arrow Connector 65">
+            <a:extLst>
+              <a:ext uri="{FF2B5EF4-FFF2-40B4-BE49-F238E27FC236}">
+                <a16:creationId xmlns:a16="http://schemas.microsoft.com/office/drawing/2014/main" id="{027569BF-0937-4A61-82F8-7252AF3D5316}"/>
+              </a:ext>
+            </a:extLst>
+          </p:cNvPr>
+          <p:cNvCxnSpPr>
+            <a:cxnSpLocks/>
+          </p:cNvCxnSpPr>
+          <p:nvPr/>
+        </p:nvCxnSpPr>
+        <p:spPr>
+          <a:xfrm>
+            <a:off x="8395063" y="2897761"/>
+            <a:ext cx="0" cy="404940"/>
+          </a:xfrm>
+          <a:prstGeom prst="straightConnector1">
+            <a:avLst/>
+          </a:prstGeom>
+          <a:ln w="38100">
+            <a:tailEnd type="triangle"/>
+          </a:ln>
+        </p:spPr>
+        <p:style>
+          <a:lnRef idx="3">
+            <a:schemeClr val="accent6"/>
+          </a:lnRef>
+          <a:fillRef idx="0">
+            <a:schemeClr val="accent6"/>
+          </a:fillRef>
+          <a:effectRef idx="2">
+            <a:schemeClr val="accent6"/>
+          </a:effectRef>
+          <a:fontRef idx="minor">
+            <a:schemeClr val="tx1"/>
+          </a:fontRef>
+        </p:style>
+      </p:cxnSp>
+      <p:cxnSp>
+        <p:nvCxnSpPr>
+          <p:cNvPr id="79" name="Straight Arrow Connector 78">
+            <a:extLst>
+              <a:ext uri="{FF2B5EF4-FFF2-40B4-BE49-F238E27FC236}">
+                <a16:creationId xmlns:a16="http://schemas.microsoft.com/office/drawing/2014/main" id="{3287E013-D719-430A-A796-87298C93B45C}"/>
+              </a:ext>
+            </a:extLst>
+          </p:cNvPr>
+          <p:cNvCxnSpPr>
+            <a:cxnSpLocks/>
+          </p:cNvCxnSpPr>
+          <p:nvPr/>
+        </p:nvCxnSpPr>
+        <p:spPr>
+          <a:xfrm rot="10800000">
+            <a:off x="8395063" y="5856531"/>
+            <a:ext cx="0" cy="404940"/>
+          </a:xfrm>
+          <a:prstGeom prst="straightConnector1">
+            <a:avLst/>
+          </a:prstGeom>
+          <a:ln w="38100">
+            <a:tailEnd type="triangle"/>
+          </a:ln>
+        </p:spPr>
+        <p:style>
+          <a:lnRef idx="3">
+            <a:schemeClr val="accent6"/>
+          </a:lnRef>
+          <a:fillRef idx="0">
+            <a:schemeClr val="accent6"/>
+          </a:fillRef>
+          <a:effectRef idx="2">
+            <a:schemeClr val="accent6"/>
+          </a:effectRef>
+          <a:fontRef idx="minor">
+            <a:schemeClr val="tx1"/>
+          </a:fontRef>
+        </p:style>
+      </p:cxnSp>
+      <p:cxnSp>
+        <p:nvCxnSpPr>
+          <p:cNvPr id="80" name="Straight Arrow Connector 79">
+            <a:extLst>
+              <a:ext uri="{FF2B5EF4-FFF2-40B4-BE49-F238E27FC236}">
+                <a16:creationId xmlns:a16="http://schemas.microsoft.com/office/drawing/2014/main" id="{51260F22-E529-40EF-BF75-D2CEDDA918FC}"/>
+              </a:ext>
+            </a:extLst>
+          </p:cNvPr>
+          <p:cNvCxnSpPr>
+            <a:cxnSpLocks/>
+          </p:cNvCxnSpPr>
+          <p:nvPr/>
+        </p:nvCxnSpPr>
+        <p:spPr>
+          <a:xfrm rot="10800000">
+            <a:off x="8395063" y="5255626"/>
+            <a:ext cx="0" cy="404940"/>
+          </a:xfrm>
+          <a:prstGeom prst="straightConnector1">
+            <a:avLst/>
+          </a:prstGeom>
+          <a:ln w="38100">
+            <a:tailEnd type="triangle"/>
+          </a:ln>
+        </p:spPr>
+        <p:style>
+          <a:lnRef idx="3">
+            <a:schemeClr val="accent6"/>
+          </a:lnRef>
+          <a:fillRef idx="0">
+            <a:schemeClr val="accent6"/>
+          </a:fillRef>
+          <a:effectRef idx="2">
+            <a:schemeClr val="accent6"/>
+          </a:effectRef>
+          <a:fontRef idx="minor">
+            <a:schemeClr val="tx1"/>
+          </a:fontRef>
+        </p:style>
+      </p:cxnSp>
+      <p:cxnSp>
+        <p:nvCxnSpPr>
+          <p:cNvPr id="81" name="Straight Arrow Connector 80">
+            <a:extLst>
+              <a:ext uri="{FF2B5EF4-FFF2-40B4-BE49-F238E27FC236}">
+                <a16:creationId xmlns:a16="http://schemas.microsoft.com/office/drawing/2014/main" id="{AF5BEBA8-C65D-4544-99DB-6697EB962E97}"/>
+              </a:ext>
+            </a:extLst>
+          </p:cNvPr>
+          <p:cNvCxnSpPr>
+            <a:cxnSpLocks/>
+          </p:cNvCxnSpPr>
+          <p:nvPr/>
+        </p:nvCxnSpPr>
+        <p:spPr>
+          <a:xfrm rot="10800000">
+            <a:off x="8395063" y="4659104"/>
+            <a:ext cx="0" cy="404940"/>
+          </a:xfrm>
+          <a:prstGeom prst="straightConnector1">
+            <a:avLst/>
+          </a:prstGeom>
+          <a:ln w="38100">
+            <a:tailEnd type="triangle"/>
+          </a:ln>
+        </p:spPr>
+        <p:style>
+          <a:lnRef idx="3">
+            <a:schemeClr val="accent6"/>
+          </a:lnRef>
+          <a:fillRef idx="0">
+            <a:schemeClr val="accent6"/>
+          </a:fillRef>
+          <a:effectRef idx="2">
+            <a:schemeClr val="accent6"/>
+          </a:effectRef>
+          <a:fontRef idx="minor">
+            <a:schemeClr val="tx1"/>
+          </a:fontRef>
+        </p:style>
+      </p:cxnSp>
+      <p:cxnSp>
+        <p:nvCxnSpPr>
+          <p:cNvPr id="82" name="Straight Arrow Connector 81">
+            <a:extLst>
+              <a:ext uri="{FF2B5EF4-FFF2-40B4-BE49-F238E27FC236}">
+                <a16:creationId xmlns:a16="http://schemas.microsoft.com/office/drawing/2014/main" id="{521D4F90-DAAE-49AE-A11D-16B97591FC20}"/>
+              </a:ext>
+            </a:extLst>
+          </p:cNvPr>
+          <p:cNvCxnSpPr>
+            <a:cxnSpLocks/>
+          </p:cNvCxnSpPr>
+          <p:nvPr/>
+        </p:nvCxnSpPr>
+        <p:spPr>
+          <a:xfrm rot="10800000">
+            <a:off x="8395063" y="4058214"/>
+            <a:ext cx="0" cy="404940"/>
+          </a:xfrm>
+          <a:prstGeom prst="straightConnector1">
+            <a:avLst/>
+          </a:prstGeom>
+          <a:ln w="38100">
+            <a:tailEnd type="triangle"/>
+          </a:ln>
+        </p:spPr>
+        <p:style>
+          <a:lnRef idx="3">
+            <a:schemeClr val="accent6"/>
+          </a:lnRef>
+          <a:fillRef idx="0">
+            <a:schemeClr val="accent6"/>
+          </a:fillRef>
+          <a:effectRef idx="2">
+            <a:schemeClr val="accent6"/>
+          </a:effectRef>
+          <a:fontRef idx="minor">
+            <a:schemeClr val="tx1"/>
+          </a:fontRef>
+        </p:style>
+      </p:cxnSp>
+      <p:cxnSp>
+        <p:nvCxnSpPr>
+          <p:cNvPr id="84" name="Straight Arrow Connector 83">
+            <a:extLst>
+              <a:ext uri="{FF2B5EF4-FFF2-40B4-BE49-F238E27FC236}">
+                <a16:creationId xmlns:a16="http://schemas.microsoft.com/office/drawing/2014/main" id="{1EFF2D72-42C0-4AA5-BACD-BD39D7F9241E}"/>
+              </a:ext>
+            </a:extLst>
+          </p:cNvPr>
+          <p:cNvCxnSpPr>
+            <a:cxnSpLocks/>
+          </p:cNvCxnSpPr>
+          <p:nvPr/>
+        </p:nvCxnSpPr>
+        <p:spPr>
+          <a:xfrm rot="10800000">
+            <a:off x="8982892" y="5843472"/>
+            <a:ext cx="0" cy="404940"/>
+          </a:xfrm>
+          <a:prstGeom prst="straightConnector1">
+            <a:avLst/>
+          </a:prstGeom>
+          <a:ln w="38100">
+            <a:tailEnd type="triangle"/>
+          </a:ln>
+        </p:spPr>
+        <p:style>
+          <a:lnRef idx="3">
+            <a:schemeClr val="accent6"/>
+          </a:lnRef>
+          <a:fillRef idx="0">
+            <a:schemeClr val="accent6"/>
+          </a:fillRef>
+          <a:effectRef idx="2">
+            <a:schemeClr val="accent6"/>
+          </a:effectRef>
+          <a:fontRef idx="minor">
+            <a:schemeClr val="tx1"/>
+          </a:fontRef>
+        </p:style>
+      </p:cxnSp>
+      <p:cxnSp>
+        <p:nvCxnSpPr>
+          <p:cNvPr id="85" name="Straight Arrow Connector 84">
+            <a:extLst>
+              <a:ext uri="{FF2B5EF4-FFF2-40B4-BE49-F238E27FC236}">
+                <a16:creationId xmlns:a16="http://schemas.microsoft.com/office/drawing/2014/main" id="{634BE3AE-2BDE-469B-B598-149C4F61FC16}"/>
+              </a:ext>
+            </a:extLst>
+          </p:cNvPr>
+          <p:cNvCxnSpPr>
+            <a:cxnSpLocks/>
+          </p:cNvCxnSpPr>
+          <p:nvPr/>
+        </p:nvCxnSpPr>
+        <p:spPr>
+          <a:xfrm rot="10800000">
+            <a:off x="8982892" y="5242567"/>
+            <a:ext cx="0" cy="404940"/>
+          </a:xfrm>
+          <a:prstGeom prst="straightConnector1">
+            <a:avLst/>
+          </a:prstGeom>
+          <a:ln w="38100">
+            <a:tailEnd type="triangle"/>
+          </a:ln>
+        </p:spPr>
+        <p:style>
+          <a:lnRef idx="3">
+            <a:schemeClr val="accent6"/>
+          </a:lnRef>
+          <a:fillRef idx="0">
+            <a:schemeClr val="accent6"/>
+          </a:fillRef>
+          <a:effectRef idx="2">
+            <a:schemeClr val="accent6"/>
+          </a:effectRef>
+          <a:fontRef idx="minor">
+            <a:schemeClr val="tx1"/>
+          </a:fontRef>
+        </p:style>
+      </p:cxnSp>
+      <p:cxnSp>
+        <p:nvCxnSpPr>
+          <p:cNvPr id="86" name="Straight Arrow Connector 85">
+            <a:extLst>
+              <a:ext uri="{FF2B5EF4-FFF2-40B4-BE49-F238E27FC236}">
+                <a16:creationId xmlns:a16="http://schemas.microsoft.com/office/drawing/2014/main" id="{B181667B-A651-4EB7-8841-66F635172BF4}"/>
+              </a:ext>
+            </a:extLst>
+          </p:cNvPr>
+          <p:cNvCxnSpPr>
+            <a:cxnSpLocks/>
+          </p:cNvCxnSpPr>
+          <p:nvPr/>
+        </p:nvCxnSpPr>
+        <p:spPr>
+          <a:xfrm rot="10800000">
+            <a:off x="8982892" y="4646045"/>
+            <a:ext cx="0" cy="404940"/>
+          </a:xfrm>
+          <a:prstGeom prst="straightConnector1">
+            <a:avLst/>
+          </a:prstGeom>
+          <a:ln w="38100">
+            <a:tailEnd type="triangle"/>
+          </a:ln>
+        </p:spPr>
+        <p:style>
+          <a:lnRef idx="3">
+            <a:schemeClr val="accent6"/>
+          </a:lnRef>
+          <a:fillRef idx="0">
+            <a:schemeClr val="accent6"/>
+          </a:fillRef>
+          <a:effectRef idx="2">
+            <a:schemeClr val="accent6"/>
+          </a:effectRef>
+          <a:fontRef idx="minor">
+            <a:schemeClr val="tx1"/>
+          </a:fontRef>
+        </p:style>
+      </p:cxnSp>
+      <p:cxnSp>
+        <p:nvCxnSpPr>
+          <p:cNvPr id="87" name="Straight Arrow Connector 86">
+            <a:extLst>
+              <a:ext uri="{FF2B5EF4-FFF2-40B4-BE49-F238E27FC236}">
+                <a16:creationId xmlns:a16="http://schemas.microsoft.com/office/drawing/2014/main" id="{2909B545-295E-44EB-8F3C-C8C6BAB55F30}"/>
+              </a:ext>
+            </a:extLst>
+          </p:cNvPr>
+          <p:cNvCxnSpPr>
+            <a:cxnSpLocks/>
+          </p:cNvCxnSpPr>
+          <p:nvPr/>
+        </p:nvCxnSpPr>
+        <p:spPr>
+          <a:xfrm rot="10800000">
+            <a:off x="8982892" y="4045155"/>
+            <a:ext cx="0" cy="404940"/>
+          </a:xfrm>
+          <a:prstGeom prst="straightConnector1">
+            <a:avLst/>
+          </a:prstGeom>
+          <a:ln w="38100">
+            <a:tailEnd type="triangle"/>
+          </a:ln>
+        </p:spPr>
+        <p:style>
+          <a:lnRef idx="3">
+            <a:schemeClr val="accent6"/>
+          </a:lnRef>
+          <a:fillRef idx="0">
+            <a:schemeClr val="accent6"/>
+          </a:fillRef>
+          <a:effectRef idx="2">
+            <a:schemeClr val="accent6"/>
+          </a:effectRef>
+          <a:fontRef idx="minor">
+            <a:schemeClr val="tx1"/>
+          </a:fontRef>
+        </p:style>
+      </p:cxnSp>
+      <p:cxnSp>
+        <p:nvCxnSpPr>
+          <p:cNvPr id="88" name="Straight Arrow Connector 87">
+            <a:extLst>
+              <a:ext uri="{FF2B5EF4-FFF2-40B4-BE49-F238E27FC236}">
+                <a16:creationId xmlns:a16="http://schemas.microsoft.com/office/drawing/2014/main" id="{CDB8E046-8014-4AD6-856E-F1A962FDC050}"/>
+              </a:ext>
+            </a:extLst>
+          </p:cNvPr>
+          <p:cNvCxnSpPr/>
+          <p:nvPr/>
+        </p:nvCxnSpPr>
+        <p:spPr>
+          <a:xfrm>
+            <a:off x="5808626" y="4302037"/>
+            <a:ext cx="383177" cy="0"/>
+          </a:xfrm>
+          <a:prstGeom prst="straightConnector1">
+            <a:avLst/>
+          </a:prstGeom>
+          <a:ln w="38100">
+            <a:tailEnd type="triangle"/>
+          </a:ln>
+        </p:spPr>
+        <p:style>
+          <a:lnRef idx="3">
+            <a:schemeClr val="accent6"/>
+          </a:lnRef>
+          <a:fillRef idx="0">
+            <a:schemeClr val="accent6"/>
+          </a:fillRef>
+          <a:effectRef idx="2">
+            <a:schemeClr val="accent6"/>
+          </a:effectRef>
+          <a:fontRef idx="minor">
+            <a:schemeClr val="tx1"/>
+          </a:fontRef>
+        </p:style>
+      </p:cxnSp>
+      <p:cxnSp>
+        <p:nvCxnSpPr>
+          <p:cNvPr id="89" name="Straight Arrow Connector 88">
+            <a:extLst>
+              <a:ext uri="{FF2B5EF4-FFF2-40B4-BE49-F238E27FC236}">
+                <a16:creationId xmlns:a16="http://schemas.microsoft.com/office/drawing/2014/main" id="{D17BC6B0-8F15-4D91-A45E-0CFA6D69AFD6}"/>
+              </a:ext>
+            </a:extLst>
+          </p:cNvPr>
+          <p:cNvCxnSpPr/>
+          <p:nvPr/>
+        </p:nvCxnSpPr>
+        <p:spPr>
+          <a:xfrm>
+            <a:off x="6418227" y="4302037"/>
+            <a:ext cx="383177" cy="0"/>
+          </a:xfrm>
+          <a:prstGeom prst="straightConnector1">
+            <a:avLst/>
+          </a:prstGeom>
+          <a:ln w="38100">
+            <a:tailEnd type="triangle"/>
+          </a:ln>
+        </p:spPr>
+        <p:style>
+          <a:lnRef idx="3">
+            <a:schemeClr val="accent6"/>
+          </a:lnRef>
+          <a:fillRef idx="0">
+            <a:schemeClr val="accent6"/>
+          </a:fillRef>
+          <a:effectRef idx="2">
+            <a:schemeClr val="accent6"/>
+          </a:effectRef>
+          <a:fontRef idx="minor">
+            <a:schemeClr val="tx1"/>
+          </a:fontRef>
+        </p:style>
+      </p:cxnSp>
+      <p:cxnSp>
+        <p:nvCxnSpPr>
+          <p:cNvPr id="90" name="Straight Arrow Connector 89">
+            <a:extLst>
+              <a:ext uri="{FF2B5EF4-FFF2-40B4-BE49-F238E27FC236}">
+                <a16:creationId xmlns:a16="http://schemas.microsoft.com/office/drawing/2014/main" id="{026A15A8-2188-4566-A1D6-DE95A1CFDFD4}"/>
+              </a:ext>
+            </a:extLst>
+          </p:cNvPr>
+          <p:cNvCxnSpPr/>
+          <p:nvPr/>
+        </p:nvCxnSpPr>
+        <p:spPr>
+          <a:xfrm>
+            <a:off x="7010408" y="4302037"/>
+            <a:ext cx="383177" cy="0"/>
+          </a:xfrm>
+          <a:prstGeom prst="straightConnector1">
+            <a:avLst/>
+          </a:prstGeom>
+          <a:ln w="38100">
+            <a:tailEnd type="triangle"/>
+          </a:ln>
+        </p:spPr>
+        <p:style>
+          <a:lnRef idx="3">
+            <a:schemeClr val="accent6"/>
+          </a:lnRef>
+          <a:fillRef idx="0">
+            <a:schemeClr val="accent6"/>
+          </a:fillRef>
+          <a:effectRef idx="2">
+            <a:schemeClr val="accent6"/>
+          </a:effectRef>
+          <a:fontRef idx="minor">
+            <a:schemeClr val="tx1"/>
+          </a:fontRef>
+        </p:style>
+      </p:cxnSp>
+      <p:cxnSp>
+        <p:nvCxnSpPr>
+          <p:cNvPr id="91" name="Straight Arrow Connector 90">
+            <a:extLst>
+              <a:ext uri="{FF2B5EF4-FFF2-40B4-BE49-F238E27FC236}">
+                <a16:creationId xmlns:a16="http://schemas.microsoft.com/office/drawing/2014/main" id="{184DCDDA-A4FC-475B-9513-6AD8AFFF441D}"/>
+              </a:ext>
+            </a:extLst>
+          </p:cNvPr>
+          <p:cNvCxnSpPr/>
+          <p:nvPr/>
+        </p:nvCxnSpPr>
+        <p:spPr>
+          <a:xfrm>
+            <a:off x="5808626" y="3087172"/>
+            <a:ext cx="383177" cy="0"/>
+          </a:xfrm>
+          <a:prstGeom prst="straightConnector1">
+            <a:avLst/>
+          </a:prstGeom>
+          <a:ln w="38100">
+            <a:tailEnd type="triangle"/>
+          </a:ln>
+        </p:spPr>
+        <p:style>
+          <a:lnRef idx="3">
+            <a:schemeClr val="accent6"/>
+          </a:lnRef>
+          <a:fillRef idx="0">
+            <a:schemeClr val="accent6"/>
+          </a:fillRef>
+          <a:effectRef idx="2">
+            <a:schemeClr val="accent6"/>
+          </a:effectRef>
+          <a:fontRef idx="minor">
+            <a:schemeClr val="tx1"/>
+          </a:fontRef>
+        </p:style>
+      </p:cxnSp>
+      <p:cxnSp>
+        <p:nvCxnSpPr>
+          <p:cNvPr id="92" name="Straight Arrow Connector 91">
+            <a:extLst>
+              <a:ext uri="{FF2B5EF4-FFF2-40B4-BE49-F238E27FC236}">
+                <a16:creationId xmlns:a16="http://schemas.microsoft.com/office/drawing/2014/main" id="{2B6B7CA7-8E54-42C8-862F-7528F155ADDD}"/>
+              </a:ext>
+            </a:extLst>
+          </p:cNvPr>
+          <p:cNvCxnSpPr/>
+          <p:nvPr/>
+        </p:nvCxnSpPr>
+        <p:spPr>
+          <a:xfrm>
+            <a:off x="6418227" y="3087172"/>
+            <a:ext cx="383177" cy="0"/>
+          </a:xfrm>
+          <a:prstGeom prst="straightConnector1">
+            <a:avLst/>
+          </a:prstGeom>
+          <a:ln w="38100">
+            <a:tailEnd type="triangle"/>
+          </a:ln>
+        </p:spPr>
+        <p:style>
+          <a:lnRef idx="3">
+            <a:schemeClr val="accent6"/>
+          </a:lnRef>
+          <a:fillRef idx="0">
+            <a:schemeClr val="accent6"/>
+          </a:fillRef>
+          <a:effectRef idx="2">
+            <a:schemeClr val="accent6"/>
+          </a:effectRef>
+          <a:fontRef idx="minor">
+            <a:schemeClr val="tx1"/>
+          </a:fontRef>
+        </p:style>
+      </p:cxnSp>
+      <p:cxnSp>
+        <p:nvCxnSpPr>
+          <p:cNvPr id="93" name="Straight Arrow Connector 92">
+            <a:extLst>
+              <a:ext uri="{FF2B5EF4-FFF2-40B4-BE49-F238E27FC236}">
+                <a16:creationId xmlns:a16="http://schemas.microsoft.com/office/drawing/2014/main" id="{82CBDA39-27A8-48C0-A14C-839550795E70}"/>
+              </a:ext>
+            </a:extLst>
+          </p:cNvPr>
+          <p:cNvCxnSpPr/>
+          <p:nvPr/>
+        </p:nvCxnSpPr>
+        <p:spPr>
+          <a:xfrm>
+            <a:off x="7010408" y="3087172"/>
+            <a:ext cx="383177" cy="0"/>
+          </a:xfrm>
+          <a:prstGeom prst="straightConnector1">
+            <a:avLst/>
+          </a:prstGeom>
+          <a:ln w="38100">
+            <a:tailEnd type="triangle"/>
+          </a:ln>
+        </p:spPr>
+        <p:style>
+          <a:lnRef idx="3">
+            <a:schemeClr val="accent6"/>
+          </a:lnRef>
+          <a:fillRef idx="0">
+            <a:schemeClr val="accent6"/>
+          </a:fillRef>
+          <a:effectRef idx="2">
+            <a:schemeClr val="accent6"/>
+          </a:effectRef>
+          <a:fontRef idx="minor">
+            <a:schemeClr val="tx1"/>
+          </a:fontRef>
+        </p:style>
+      </p:cxnSp>
+      <p:cxnSp>
+        <p:nvCxnSpPr>
+          <p:cNvPr id="94" name="Straight Arrow Connector 93">
+            <a:extLst>
+              <a:ext uri="{FF2B5EF4-FFF2-40B4-BE49-F238E27FC236}">
+                <a16:creationId xmlns:a16="http://schemas.microsoft.com/office/drawing/2014/main" id="{CB97F1F8-59AC-4706-95DE-0DD9E841A6B6}"/>
+              </a:ext>
+            </a:extLst>
+          </p:cNvPr>
+          <p:cNvCxnSpPr/>
+          <p:nvPr/>
+        </p:nvCxnSpPr>
+        <p:spPr>
+          <a:xfrm>
+            <a:off x="5808625" y="2508061"/>
+            <a:ext cx="383177" cy="0"/>
+          </a:xfrm>
+          <a:prstGeom prst="straightConnector1">
+            <a:avLst/>
+          </a:prstGeom>
+          <a:ln w="38100">
+            <a:tailEnd type="triangle"/>
+          </a:ln>
+        </p:spPr>
+        <p:style>
+          <a:lnRef idx="3">
+            <a:schemeClr val="accent6"/>
+          </a:lnRef>
+          <a:fillRef idx="0">
+            <a:schemeClr val="accent6"/>
+          </a:fillRef>
+          <a:effectRef idx="2">
+            <a:schemeClr val="accent6"/>
+          </a:effectRef>
+          <a:fontRef idx="minor">
+            <a:schemeClr val="tx1"/>
+          </a:fontRef>
+        </p:style>
+      </p:cxnSp>
+      <p:cxnSp>
+        <p:nvCxnSpPr>
+          <p:cNvPr id="95" name="Straight Arrow Connector 94">
+            <a:extLst>
+              <a:ext uri="{FF2B5EF4-FFF2-40B4-BE49-F238E27FC236}">
+                <a16:creationId xmlns:a16="http://schemas.microsoft.com/office/drawing/2014/main" id="{19E93398-E519-4034-8A33-62B4E0B1B89B}"/>
+              </a:ext>
+            </a:extLst>
+          </p:cNvPr>
+          <p:cNvCxnSpPr/>
+          <p:nvPr/>
+        </p:nvCxnSpPr>
+        <p:spPr>
+          <a:xfrm>
+            <a:off x="6418226" y="2508061"/>
+            <a:ext cx="383177" cy="0"/>
+          </a:xfrm>
+          <a:prstGeom prst="straightConnector1">
+            <a:avLst/>
+          </a:prstGeom>
+          <a:ln w="38100">
+            <a:tailEnd type="triangle"/>
+          </a:ln>
+        </p:spPr>
+        <p:style>
+          <a:lnRef idx="3">
+            <a:schemeClr val="accent6"/>
+          </a:lnRef>
+          <a:fillRef idx="0">
+            <a:schemeClr val="accent6"/>
+          </a:fillRef>
+          <a:effectRef idx="2">
+            <a:schemeClr val="accent6"/>
+          </a:effectRef>
+          <a:fontRef idx="minor">
+            <a:schemeClr val="tx1"/>
+          </a:fontRef>
+        </p:style>
+      </p:cxnSp>
+      <p:cxnSp>
+        <p:nvCxnSpPr>
+          <p:cNvPr id="96" name="Straight Arrow Connector 95">
+            <a:extLst>
+              <a:ext uri="{FF2B5EF4-FFF2-40B4-BE49-F238E27FC236}">
+                <a16:creationId xmlns:a16="http://schemas.microsoft.com/office/drawing/2014/main" id="{5A14BC93-2AA7-42A4-86A5-9AA69BF6E844}"/>
+              </a:ext>
+            </a:extLst>
+          </p:cNvPr>
+          <p:cNvCxnSpPr/>
+          <p:nvPr/>
+        </p:nvCxnSpPr>
+        <p:spPr>
+          <a:xfrm>
+            <a:off x="7010407" y="2508061"/>
+            <a:ext cx="383177" cy="0"/>
+          </a:xfrm>
+          <a:prstGeom prst="straightConnector1">
+            <a:avLst/>
+          </a:prstGeom>
+          <a:ln w="38100">
+            <a:tailEnd type="triangle"/>
+          </a:ln>
+        </p:spPr>
+        <p:style>
+          <a:lnRef idx="3">
+            <a:schemeClr val="accent6"/>
+          </a:lnRef>
+          <a:fillRef idx="0">
+            <a:schemeClr val="accent6"/>
+          </a:fillRef>
+          <a:effectRef idx="2">
+            <a:schemeClr val="accent6"/>
+          </a:effectRef>
+          <a:fontRef idx="minor">
+            <a:schemeClr val="tx1"/>
+          </a:fontRef>
+        </p:style>
+      </p:cxnSp>
+      <p:cxnSp>
+        <p:nvCxnSpPr>
+          <p:cNvPr id="97" name="Straight Arrow Connector 96">
+            <a:extLst>
+              <a:ext uri="{FF2B5EF4-FFF2-40B4-BE49-F238E27FC236}">
+                <a16:creationId xmlns:a16="http://schemas.microsoft.com/office/drawing/2014/main" id="{A65D5849-15AF-4CE2-A727-741E59C17EFC}"/>
+              </a:ext>
+            </a:extLst>
+          </p:cNvPr>
+          <p:cNvCxnSpPr/>
+          <p:nvPr/>
+        </p:nvCxnSpPr>
+        <p:spPr>
+          <a:xfrm>
+            <a:off x="5808624" y="4894213"/>
+            <a:ext cx="383177" cy="0"/>
+          </a:xfrm>
+          <a:prstGeom prst="straightConnector1">
+            <a:avLst/>
+          </a:prstGeom>
+          <a:ln w="38100">
+            <a:tailEnd type="triangle"/>
+          </a:ln>
+        </p:spPr>
+        <p:style>
+          <a:lnRef idx="3">
+            <a:schemeClr val="accent6"/>
+          </a:lnRef>
+          <a:fillRef idx="0">
+            <a:schemeClr val="accent6"/>
+          </a:fillRef>
+          <a:effectRef idx="2">
+            <a:schemeClr val="accent6"/>
+          </a:effectRef>
+          <a:fontRef idx="minor">
+            <a:schemeClr val="tx1"/>
+          </a:fontRef>
+        </p:style>
+      </p:cxnSp>
+      <p:cxnSp>
+        <p:nvCxnSpPr>
+          <p:cNvPr id="98" name="Straight Arrow Connector 97">
+            <a:extLst>
+              <a:ext uri="{FF2B5EF4-FFF2-40B4-BE49-F238E27FC236}">
+                <a16:creationId xmlns:a16="http://schemas.microsoft.com/office/drawing/2014/main" id="{27B7CE0F-06E9-4EB1-AA8E-3C4A99D33D49}"/>
+              </a:ext>
+            </a:extLst>
+          </p:cNvPr>
+          <p:cNvCxnSpPr/>
+          <p:nvPr/>
+        </p:nvCxnSpPr>
+        <p:spPr>
+          <a:xfrm>
+            <a:off x="6418225" y="4894213"/>
+            <a:ext cx="383177" cy="0"/>
+          </a:xfrm>
+          <a:prstGeom prst="straightConnector1">
+            <a:avLst/>
+          </a:prstGeom>
+          <a:ln w="38100">
+            <a:tailEnd type="triangle"/>
+          </a:ln>
+        </p:spPr>
+        <p:style>
+          <a:lnRef idx="3">
+            <a:schemeClr val="accent6"/>
+          </a:lnRef>
+          <a:fillRef idx="0">
+            <a:schemeClr val="accent6"/>
+          </a:fillRef>
+          <a:effectRef idx="2">
+            <a:schemeClr val="accent6"/>
+          </a:effectRef>
+          <a:fontRef idx="minor">
+            <a:schemeClr val="tx1"/>
+          </a:fontRef>
+        </p:style>
+      </p:cxnSp>
+      <p:cxnSp>
+        <p:nvCxnSpPr>
+          <p:cNvPr id="99" name="Straight Arrow Connector 98">
+            <a:extLst>
+              <a:ext uri="{FF2B5EF4-FFF2-40B4-BE49-F238E27FC236}">
+                <a16:creationId xmlns:a16="http://schemas.microsoft.com/office/drawing/2014/main" id="{24D2422F-245B-4C44-AFF1-A6E426D6B73A}"/>
+              </a:ext>
+            </a:extLst>
+          </p:cNvPr>
+          <p:cNvCxnSpPr/>
+          <p:nvPr/>
+        </p:nvCxnSpPr>
+        <p:spPr>
+          <a:xfrm>
+            <a:off x="7010406" y="4894213"/>
+            <a:ext cx="383177" cy="0"/>
+          </a:xfrm>
+          <a:prstGeom prst="straightConnector1">
+            <a:avLst/>
+          </a:prstGeom>
+          <a:ln w="38100">
+            <a:tailEnd type="triangle"/>
+          </a:ln>
+        </p:spPr>
+        <p:style>
+          <a:lnRef idx="3">
+            <a:schemeClr val="accent6"/>
+          </a:lnRef>
+          <a:fillRef idx="0">
+            <a:schemeClr val="accent6"/>
+          </a:fillRef>
+          <a:effectRef idx="2">
+            <a:schemeClr val="accent6"/>
+          </a:effectRef>
+          <a:fontRef idx="minor">
+            <a:schemeClr val="tx1"/>
+          </a:fontRef>
+        </p:style>
+      </p:cxnSp>
+      <p:cxnSp>
+        <p:nvCxnSpPr>
+          <p:cNvPr id="100" name="Straight Arrow Connector 99">
+            <a:extLst>
+              <a:ext uri="{FF2B5EF4-FFF2-40B4-BE49-F238E27FC236}">
+                <a16:creationId xmlns:a16="http://schemas.microsoft.com/office/drawing/2014/main" id="{F620D457-9920-46F5-B265-8FE208871230}"/>
+              </a:ext>
+            </a:extLst>
+          </p:cNvPr>
+          <p:cNvCxnSpPr>
+            <a:cxnSpLocks/>
+          </p:cNvCxnSpPr>
+          <p:nvPr/>
+        </p:nvCxnSpPr>
+        <p:spPr>
+          <a:xfrm rot="10800000">
+            <a:off x="7785466" y="5884842"/>
+            <a:ext cx="0" cy="404940"/>
+          </a:xfrm>
+          <a:prstGeom prst="straightConnector1">
+            <a:avLst/>
+          </a:prstGeom>
+          <a:ln w="38100">
+            <a:tailEnd type="triangle"/>
+          </a:ln>
+        </p:spPr>
+        <p:style>
+          <a:lnRef idx="3">
+            <a:schemeClr val="accent6"/>
+          </a:lnRef>
+          <a:fillRef idx="0">
+            <a:schemeClr val="accent6"/>
+          </a:fillRef>
+          <a:effectRef idx="2">
+            <a:schemeClr val="accent6"/>
+          </a:effectRef>
+          <a:fontRef idx="minor">
+            <a:schemeClr val="tx1"/>
+          </a:fontRef>
+        </p:style>
+      </p:cxnSp>
+      <p:cxnSp>
+        <p:nvCxnSpPr>
+          <p:cNvPr id="101" name="Straight Arrow Connector 100">
+            <a:extLst>
+              <a:ext uri="{FF2B5EF4-FFF2-40B4-BE49-F238E27FC236}">
+                <a16:creationId xmlns:a16="http://schemas.microsoft.com/office/drawing/2014/main" id="{9608AE43-4B00-4AB1-ADB3-33A6760BAF3F}"/>
+              </a:ext>
+            </a:extLst>
+          </p:cNvPr>
+          <p:cNvCxnSpPr>
+            <a:cxnSpLocks/>
+          </p:cNvCxnSpPr>
+          <p:nvPr/>
+        </p:nvCxnSpPr>
+        <p:spPr>
+          <a:xfrm rot="10800000">
+            <a:off x="7785466" y="5283937"/>
+            <a:ext cx="0" cy="404940"/>
+          </a:xfrm>
+          <a:prstGeom prst="straightConnector1">
+            <a:avLst/>
+          </a:prstGeom>
+          <a:ln w="38100">
+            <a:tailEnd type="triangle"/>
+          </a:ln>
+        </p:spPr>
+        <p:style>
+          <a:lnRef idx="3">
+            <a:schemeClr val="accent6"/>
+          </a:lnRef>
+          <a:fillRef idx="0">
+            <a:schemeClr val="accent6"/>
+          </a:fillRef>
+          <a:effectRef idx="2">
+            <a:schemeClr val="accent6"/>
+          </a:effectRef>
+          <a:fontRef idx="minor">
+            <a:schemeClr val="tx1"/>
+          </a:fontRef>
+        </p:style>
+      </p:cxnSp>
+      <p:cxnSp>
+        <p:nvCxnSpPr>
+          <p:cNvPr id="102" name="Straight Arrow Connector 101">
+            <a:extLst>
+              <a:ext uri="{FF2B5EF4-FFF2-40B4-BE49-F238E27FC236}">
+                <a16:creationId xmlns:a16="http://schemas.microsoft.com/office/drawing/2014/main" id="{B6ED4E4D-7F68-49A3-9D51-2F42C0CB525F}"/>
+              </a:ext>
+            </a:extLst>
+          </p:cNvPr>
+          <p:cNvCxnSpPr>
+            <a:cxnSpLocks/>
+          </p:cNvCxnSpPr>
+          <p:nvPr/>
+        </p:nvCxnSpPr>
+        <p:spPr>
+          <a:xfrm rot="10800000">
+            <a:off x="6588027" y="5887009"/>
+            <a:ext cx="0" cy="404940"/>
+          </a:xfrm>
+          <a:prstGeom prst="straightConnector1">
+            <a:avLst/>
+          </a:prstGeom>
+          <a:ln w="38100">
+            <a:tailEnd type="triangle"/>
+          </a:ln>
+        </p:spPr>
+        <p:style>
+          <a:lnRef idx="3">
+            <a:schemeClr val="accent6"/>
+          </a:lnRef>
+          <a:fillRef idx="0">
+            <a:schemeClr val="accent6"/>
+          </a:fillRef>
+          <a:effectRef idx="2">
+            <a:schemeClr val="accent6"/>
+          </a:effectRef>
+          <a:fontRef idx="minor">
+            <a:schemeClr val="tx1"/>
+          </a:fontRef>
+        </p:style>
+      </p:cxnSp>
+      <p:cxnSp>
+        <p:nvCxnSpPr>
+          <p:cNvPr id="103" name="Straight Arrow Connector 102">
+            <a:extLst>
+              <a:ext uri="{FF2B5EF4-FFF2-40B4-BE49-F238E27FC236}">
+                <a16:creationId xmlns:a16="http://schemas.microsoft.com/office/drawing/2014/main" id="{14A0B405-5801-446A-ACAF-D1D2EF33BB59}"/>
+              </a:ext>
+            </a:extLst>
+          </p:cNvPr>
+          <p:cNvCxnSpPr>
+            <a:cxnSpLocks/>
+          </p:cNvCxnSpPr>
+          <p:nvPr/>
+        </p:nvCxnSpPr>
+        <p:spPr>
+          <a:xfrm rot="10800000">
+            <a:off x="6588027" y="5286104"/>
+            <a:ext cx="0" cy="404940"/>
+          </a:xfrm>
+          <a:prstGeom prst="straightConnector1">
+            <a:avLst/>
+          </a:prstGeom>
+          <a:ln w="38100">
+            <a:tailEnd type="triangle"/>
+          </a:ln>
+        </p:spPr>
+        <p:style>
+          <a:lnRef idx="3">
+            <a:schemeClr val="accent6"/>
+          </a:lnRef>
+          <a:fillRef idx="0">
+            <a:schemeClr val="accent6"/>
+          </a:fillRef>
+          <a:effectRef idx="2">
+            <a:schemeClr val="accent6"/>
+          </a:effectRef>
+          <a:fontRef idx="minor">
+            <a:schemeClr val="tx1"/>
+          </a:fontRef>
+        </p:style>
+      </p:cxnSp>
+      <p:cxnSp>
+        <p:nvCxnSpPr>
+          <p:cNvPr id="104" name="Straight Arrow Connector 103">
+            <a:extLst>
+              <a:ext uri="{FF2B5EF4-FFF2-40B4-BE49-F238E27FC236}">
+                <a16:creationId xmlns:a16="http://schemas.microsoft.com/office/drawing/2014/main" id="{C9177F5B-B4FA-45D8-A224-124CFB58672E}"/>
+              </a:ext>
+            </a:extLst>
+          </p:cNvPr>
+          <p:cNvCxnSpPr>
+            <a:cxnSpLocks/>
+          </p:cNvCxnSpPr>
+          <p:nvPr/>
+        </p:nvCxnSpPr>
+        <p:spPr>
+          <a:xfrm rot="10800000">
+            <a:off x="7175856" y="5873950"/>
+            <a:ext cx="0" cy="404940"/>
+          </a:xfrm>
+          <a:prstGeom prst="straightConnector1">
+            <a:avLst/>
+          </a:prstGeom>
+          <a:ln w="38100">
+            <a:tailEnd type="triangle"/>
+          </a:ln>
+        </p:spPr>
+        <p:style>
+          <a:lnRef idx="3">
+            <a:schemeClr val="accent6"/>
+          </a:lnRef>
+          <a:fillRef idx="0">
+            <a:schemeClr val="accent6"/>
+          </a:fillRef>
+          <a:effectRef idx="2">
+            <a:schemeClr val="accent6"/>
+          </a:effectRef>
+          <a:fontRef idx="minor">
+            <a:schemeClr val="tx1"/>
+          </a:fontRef>
+        </p:style>
+      </p:cxnSp>
+      <p:cxnSp>
+        <p:nvCxnSpPr>
+          <p:cNvPr id="105" name="Straight Arrow Connector 104">
+            <a:extLst>
+              <a:ext uri="{FF2B5EF4-FFF2-40B4-BE49-F238E27FC236}">
+                <a16:creationId xmlns:a16="http://schemas.microsoft.com/office/drawing/2014/main" id="{88DC88E7-DDEF-4B35-A998-EBAD121E21AB}"/>
+              </a:ext>
+            </a:extLst>
+          </p:cNvPr>
+          <p:cNvCxnSpPr>
+            <a:cxnSpLocks/>
+          </p:cNvCxnSpPr>
+          <p:nvPr/>
+        </p:nvCxnSpPr>
+        <p:spPr>
+          <a:xfrm rot="10800000">
+            <a:off x="7175856" y="5273045"/>
+            <a:ext cx="0" cy="404940"/>
+          </a:xfrm>
+          <a:prstGeom prst="straightConnector1">
+            <a:avLst/>
+          </a:prstGeom>
+          <a:ln w="38100">
+            <a:tailEnd type="triangle"/>
+          </a:ln>
+        </p:spPr>
+        <p:style>
+          <a:lnRef idx="3">
+            <a:schemeClr val="accent6"/>
+          </a:lnRef>
+          <a:fillRef idx="0">
+            <a:schemeClr val="accent6"/>
+          </a:fillRef>
+          <a:effectRef idx="2">
+            <a:schemeClr val="accent6"/>
+          </a:effectRef>
+          <a:fontRef idx="minor">
+            <a:schemeClr val="tx1"/>
+          </a:fontRef>
+        </p:style>
+      </p:cxnSp>
+      <p:cxnSp>
+        <p:nvCxnSpPr>
+          <p:cNvPr id="106" name="Straight Arrow Connector 105">
+            <a:extLst>
+              <a:ext uri="{FF2B5EF4-FFF2-40B4-BE49-F238E27FC236}">
+                <a16:creationId xmlns:a16="http://schemas.microsoft.com/office/drawing/2014/main" id="{545FD7B4-EC2A-4F53-9A53-4CDFABF442D1}"/>
+              </a:ext>
+            </a:extLst>
+          </p:cNvPr>
+          <p:cNvCxnSpPr>
+            <a:cxnSpLocks/>
+          </p:cNvCxnSpPr>
+          <p:nvPr/>
+        </p:nvCxnSpPr>
+        <p:spPr>
+          <a:xfrm rot="10800000">
+            <a:off x="5978430" y="5897902"/>
+            <a:ext cx="0" cy="404940"/>
+          </a:xfrm>
+          <a:prstGeom prst="straightConnector1">
+            <a:avLst/>
+          </a:prstGeom>
+          <a:ln w="38100">
+            <a:tailEnd type="triangle"/>
+          </a:ln>
+        </p:spPr>
+        <p:style>
+          <a:lnRef idx="3">
+            <a:schemeClr val="accent6"/>
+          </a:lnRef>
+          <a:fillRef idx="0">
+            <a:schemeClr val="accent6"/>
+          </a:fillRef>
+          <a:effectRef idx="2">
+            <a:schemeClr val="accent6"/>
+          </a:effectRef>
+          <a:fontRef idx="minor">
+            <a:schemeClr val="tx1"/>
+          </a:fontRef>
+        </p:style>
+      </p:cxnSp>
+      <p:cxnSp>
+        <p:nvCxnSpPr>
+          <p:cNvPr id="107" name="Straight Arrow Connector 106">
+            <a:extLst>
+              <a:ext uri="{FF2B5EF4-FFF2-40B4-BE49-F238E27FC236}">
+                <a16:creationId xmlns:a16="http://schemas.microsoft.com/office/drawing/2014/main" id="{4EB05FF6-F08B-4EB1-8CBE-7E754F7090BE}"/>
+              </a:ext>
+            </a:extLst>
+          </p:cNvPr>
+          <p:cNvCxnSpPr>
+            <a:cxnSpLocks/>
+          </p:cNvCxnSpPr>
+          <p:nvPr/>
+        </p:nvCxnSpPr>
+        <p:spPr>
+          <a:xfrm rot="10800000">
+            <a:off x="5978430" y="5296997"/>
+            <a:ext cx="0" cy="404940"/>
+          </a:xfrm>
+          <a:prstGeom prst="straightConnector1">
+            <a:avLst/>
+          </a:prstGeom>
+          <a:ln w="38100">
+            <a:tailEnd type="triangle"/>
+          </a:ln>
+        </p:spPr>
+        <p:style>
+          <a:lnRef idx="3">
+            <a:schemeClr val="accent6"/>
+          </a:lnRef>
+          <a:fillRef idx="0">
+            <a:schemeClr val="accent6"/>
+          </a:fillRef>
+          <a:effectRef idx="2">
+            <a:schemeClr val="accent6"/>
+          </a:effectRef>
+          <a:fontRef idx="minor">
+            <a:schemeClr val="tx1"/>
+          </a:fontRef>
+        </p:style>
+      </p:cxnSp>
+      <p:cxnSp>
+        <p:nvCxnSpPr>
+          <p:cNvPr id="108" name="Straight Arrow Connector 107">
+            <a:extLst>
+              <a:ext uri="{FF2B5EF4-FFF2-40B4-BE49-F238E27FC236}">
+                <a16:creationId xmlns:a16="http://schemas.microsoft.com/office/drawing/2014/main" id="{31C485CC-F30E-4231-A1DD-EDBE4AB83A1D}"/>
+              </a:ext>
+            </a:extLst>
+          </p:cNvPr>
+          <p:cNvCxnSpPr>
+            <a:cxnSpLocks/>
+          </p:cNvCxnSpPr>
+          <p:nvPr/>
+        </p:nvCxnSpPr>
+        <p:spPr>
+          <a:xfrm rot="10800000">
+            <a:off x="7785465" y="4659105"/>
+            <a:ext cx="0" cy="404940"/>
+          </a:xfrm>
+          <a:prstGeom prst="straightConnector1">
+            <a:avLst/>
+          </a:prstGeom>
+          <a:ln w="38100">
+            <a:tailEnd type="triangle"/>
+          </a:ln>
+        </p:spPr>
+        <p:style>
+          <a:lnRef idx="3">
+            <a:schemeClr val="accent6"/>
+          </a:lnRef>
+          <a:fillRef idx="0">
+            <a:schemeClr val="accent6"/>
+          </a:fillRef>
+          <a:effectRef idx="2">
+            <a:schemeClr val="accent6"/>
+          </a:effectRef>
+          <a:fontRef idx="minor">
+            <a:schemeClr val="tx1"/>
+          </a:fontRef>
+        </p:style>
+      </p:cxnSp>
+      <p:cxnSp>
+        <p:nvCxnSpPr>
+          <p:cNvPr id="109" name="Straight Arrow Connector 108">
+            <a:extLst>
+              <a:ext uri="{FF2B5EF4-FFF2-40B4-BE49-F238E27FC236}">
+                <a16:creationId xmlns:a16="http://schemas.microsoft.com/office/drawing/2014/main" id="{13311383-A8F8-4010-B9FE-53EC0AE02778}"/>
+              </a:ext>
+            </a:extLst>
+          </p:cNvPr>
+          <p:cNvCxnSpPr>
+            <a:cxnSpLocks/>
+          </p:cNvCxnSpPr>
+          <p:nvPr/>
+        </p:nvCxnSpPr>
+        <p:spPr>
+          <a:xfrm rot="10800000">
+            <a:off x="7785464" y="4058214"/>
+            <a:ext cx="0" cy="404940"/>
+          </a:xfrm>
+          <a:prstGeom prst="straightConnector1">
+            <a:avLst/>
+          </a:prstGeom>
+          <a:ln w="38100">
+            <a:tailEnd type="triangle"/>
+          </a:ln>
+        </p:spPr>
+        <p:style>
+          <a:lnRef idx="3">
+            <a:schemeClr val="accent6"/>
+          </a:lnRef>
+          <a:fillRef idx="0">
+            <a:schemeClr val="accent6"/>
+          </a:fillRef>
+          <a:effectRef idx="2">
+            <a:schemeClr val="accent6"/>
+          </a:effectRef>
+          <a:fontRef idx="minor">
+            <a:schemeClr val="tx1"/>
+          </a:fontRef>
+        </p:style>
+      </p:cxnSp>
+      <p:cxnSp>
+        <p:nvCxnSpPr>
+          <p:cNvPr id="110" name="Straight Arrow Connector 109">
+            <a:extLst>
+              <a:ext uri="{FF2B5EF4-FFF2-40B4-BE49-F238E27FC236}">
+                <a16:creationId xmlns:a16="http://schemas.microsoft.com/office/drawing/2014/main" id="{623A023A-DE7B-4822-AE8E-FCBE4CC36D86}"/>
+              </a:ext>
+            </a:extLst>
+          </p:cNvPr>
+          <p:cNvCxnSpPr>
+            <a:cxnSpLocks/>
+          </p:cNvCxnSpPr>
+          <p:nvPr/>
+        </p:nvCxnSpPr>
+        <p:spPr>
+          <a:xfrm>
+            <a:off x="7789823" y="498560"/>
+            <a:ext cx="0" cy="404940"/>
+          </a:xfrm>
+          <a:prstGeom prst="straightConnector1">
+            <a:avLst/>
+          </a:prstGeom>
+          <a:ln w="38100">
+            <a:tailEnd type="triangle"/>
+          </a:ln>
+        </p:spPr>
+        <p:style>
+          <a:lnRef idx="3">
+            <a:schemeClr val="accent6"/>
+          </a:lnRef>
+          <a:fillRef idx="0">
+            <a:schemeClr val="accent6"/>
+          </a:fillRef>
+          <a:effectRef idx="2">
+            <a:schemeClr val="accent6"/>
+          </a:effectRef>
+          <a:fontRef idx="minor">
+            <a:schemeClr val="tx1"/>
+          </a:fontRef>
+        </p:style>
+      </p:cxnSp>
+      <p:cxnSp>
+        <p:nvCxnSpPr>
+          <p:cNvPr id="111" name="Straight Arrow Connector 110">
+            <a:extLst>
+              <a:ext uri="{FF2B5EF4-FFF2-40B4-BE49-F238E27FC236}">
+                <a16:creationId xmlns:a16="http://schemas.microsoft.com/office/drawing/2014/main" id="{A97C12A8-B3CB-4571-A296-4CA7BBA55BBE}"/>
+              </a:ext>
+            </a:extLst>
+          </p:cNvPr>
+          <p:cNvCxnSpPr>
+            <a:cxnSpLocks/>
+          </p:cNvCxnSpPr>
+          <p:nvPr/>
+        </p:nvCxnSpPr>
+        <p:spPr>
+          <a:xfrm>
+            <a:off x="7789823" y="1095089"/>
+            <a:ext cx="0" cy="404940"/>
+          </a:xfrm>
+          <a:prstGeom prst="straightConnector1">
+            <a:avLst/>
+          </a:prstGeom>
+          <a:ln w="38100">
+            <a:tailEnd type="triangle"/>
+          </a:ln>
+        </p:spPr>
+        <p:style>
+          <a:lnRef idx="3">
+            <a:schemeClr val="accent6"/>
+          </a:lnRef>
+          <a:fillRef idx="0">
+            <a:schemeClr val="accent6"/>
+          </a:fillRef>
+          <a:effectRef idx="2">
+            <a:schemeClr val="accent6"/>
+          </a:effectRef>
+          <a:fontRef idx="minor">
+            <a:schemeClr val="tx1"/>
+          </a:fontRef>
+        </p:style>
+      </p:cxnSp>
+      <p:cxnSp>
+        <p:nvCxnSpPr>
+          <p:cNvPr id="112" name="Straight Arrow Connector 111">
+            <a:extLst>
+              <a:ext uri="{FF2B5EF4-FFF2-40B4-BE49-F238E27FC236}">
+                <a16:creationId xmlns:a16="http://schemas.microsoft.com/office/drawing/2014/main" id="{A3C7FC8E-4370-4350-938B-2A8DC054A366}"/>
+              </a:ext>
+            </a:extLst>
+          </p:cNvPr>
+          <p:cNvCxnSpPr>
+            <a:cxnSpLocks/>
+          </p:cNvCxnSpPr>
+          <p:nvPr/>
+        </p:nvCxnSpPr>
+        <p:spPr>
+          <a:xfrm>
+            <a:off x="7789823" y="1695994"/>
+            <a:ext cx="0" cy="404940"/>
+          </a:xfrm>
+          <a:prstGeom prst="straightConnector1">
+            <a:avLst/>
+          </a:prstGeom>
+          <a:ln w="38100">
+            <a:tailEnd type="triangle"/>
+          </a:ln>
+        </p:spPr>
+        <p:style>
+          <a:lnRef idx="3">
+            <a:schemeClr val="accent6"/>
+          </a:lnRef>
+          <a:fillRef idx="0">
+            <a:schemeClr val="accent6"/>
+          </a:fillRef>
+          <a:effectRef idx="2">
+            <a:schemeClr val="accent6"/>
+          </a:effectRef>
+          <a:fontRef idx="minor">
+            <a:schemeClr val="tx1"/>
+          </a:fontRef>
+        </p:style>
+      </p:cxnSp>
+      <p:cxnSp>
+        <p:nvCxnSpPr>
+          <p:cNvPr id="113" name="Straight Arrow Connector 112">
+            <a:extLst>
+              <a:ext uri="{FF2B5EF4-FFF2-40B4-BE49-F238E27FC236}">
+                <a16:creationId xmlns:a16="http://schemas.microsoft.com/office/drawing/2014/main" id="{0A15657E-FF41-43EE-A7AE-5C70D655AA8F}"/>
+              </a:ext>
+            </a:extLst>
+          </p:cNvPr>
+          <p:cNvCxnSpPr>
+            <a:cxnSpLocks/>
+          </p:cNvCxnSpPr>
+          <p:nvPr/>
+        </p:nvCxnSpPr>
+        <p:spPr>
+          <a:xfrm>
+            <a:off x="7201994" y="511619"/>
+            <a:ext cx="0" cy="404940"/>
+          </a:xfrm>
+          <a:prstGeom prst="straightConnector1">
+            <a:avLst/>
+          </a:prstGeom>
+          <a:ln w="38100">
+            <a:tailEnd type="triangle"/>
+          </a:ln>
+        </p:spPr>
+        <p:style>
+          <a:lnRef idx="3">
+            <a:schemeClr val="accent6"/>
+          </a:lnRef>
+          <a:fillRef idx="0">
+            <a:schemeClr val="accent6"/>
+          </a:fillRef>
+          <a:effectRef idx="2">
+            <a:schemeClr val="accent6"/>
+          </a:effectRef>
+          <a:fontRef idx="minor">
+            <a:schemeClr val="tx1"/>
+          </a:fontRef>
+        </p:style>
+      </p:cxnSp>
+      <p:cxnSp>
+        <p:nvCxnSpPr>
+          <p:cNvPr id="114" name="Straight Arrow Connector 113">
+            <a:extLst>
+              <a:ext uri="{FF2B5EF4-FFF2-40B4-BE49-F238E27FC236}">
+                <a16:creationId xmlns:a16="http://schemas.microsoft.com/office/drawing/2014/main" id="{3767D801-40CA-459D-A2BD-071D8F3F3DA6}"/>
+              </a:ext>
+            </a:extLst>
+          </p:cNvPr>
+          <p:cNvCxnSpPr>
+            <a:cxnSpLocks/>
+          </p:cNvCxnSpPr>
+          <p:nvPr/>
+        </p:nvCxnSpPr>
+        <p:spPr>
+          <a:xfrm>
+            <a:off x="7201994" y="1108148"/>
+            <a:ext cx="0" cy="404940"/>
+          </a:xfrm>
+          <a:prstGeom prst="straightConnector1">
+            <a:avLst/>
+          </a:prstGeom>
+          <a:ln w="38100">
+            <a:tailEnd type="triangle"/>
+          </a:ln>
+        </p:spPr>
+        <p:style>
+          <a:lnRef idx="3">
+            <a:schemeClr val="accent6"/>
+          </a:lnRef>
+          <a:fillRef idx="0">
+            <a:schemeClr val="accent6"/>
+          </a:fillRef>
+          <a:effectRef idx="2">
+            <a:schemeClr val="accent6"/>
+          </a:effectRef>
+          <a:fontRef idx="minor">
+            <a:schemeClr val="tx1"/>
+          </a:fontRef>
+        </p:style>
+      </p:cxnSp>
+      <p:cxnSp>
+        <p:nvCxnSpPr>
+          <p:cNvPr id="115" name="Straight Arrow Connector 114">
+            <a:extLst>
+              <a:ext uri="{FF2B5EF4-FFF2-40B4-BE49-F238E27FC236}">
+                <a16:creationId xmlns:a16="http://schemas.microsoft.com/office/drawing/2014/main" id="{24D77399-0BCF-431A-82FA-09F4E9DFB111}"/>
+              </a:ext>
+            </a:extLst>
+          </p:cNvPr>
+          <p:cNvCxnSpPr>
+            <a:cxnSpLocks/>
+          </p:cNvCxnSpPr>
+          <p:nvPr/>
+        </p:nvCxnSpPr>
+        <p:spPr>
+          <a:xfrm>
+            <a:off x="7201994" y="1709053"/>
+            <a:ext cx="0" cy="404940"/>
+          </a:xfrm>
+          <a:prstGeom prst="straightConnector1">
+            <a:avLst/>
+          </a:prstGeom>
+          <a:ln w="38100">
+            <a:tailEnd type="triangle"/>
+          </a:ln>
+        </p:spPr>
+        <p:style>
+          <a:lnRef idx="3">
+            <a:schemeClr val="accent6"/>
+          </a:lnRef>
+          <a:fillRef idx="0">
+            <a:schemeClr val="accent6"/>
+          </a:fillRef>
+          <a:effectRef idx="2">
+            <a:schemeClr val="accent6"/>
+          </a:effectRef>
+          <a:fontRef idx="minor">
+            <a:schemeClr val="tx1"/>
+          </a:fontRef>
+        </p:style>
+      </p:cxnSp>
+      <p:cxnSp>
+        <p:nvCxnSpPr>
+          <p:cNvPr id="116" name="Straight Arrow Connector 115">
+            <a:extLst>
+              <a:ext uri="{FF2B5EF4-FFF2-40B4-BE49-F238E27FC236}">
+                <a16:creationId xmlns:a16="http://schemas.microsoft.com/office/drawing/2014/main" id="{39D9A4BB-7B12-4EA4-ABAE-47DA83E914F3}"/>
+              </a:ext>
+            </a:extLst>
+          </p:cNvPr>
+          <p:cNvCxnSpPr>
+            <a:cxnSpLocks/>
+          </p:cNvCxnSpPr>
+          <p:nvPr/>
+        </p:nvCxnSpPr>
+        <p:spPr>
+          <a:xfrm>
+            <a:off x="6588041" y="485501"/>
+            <a:ext cx="0" cy="404940"/>
+          </a:xfrm>
+          <a:prstGeom prst="straightConnector1">
+            <a:avLst/>
+          </a:prstGeom>
+          <a:ln w="38100">
+            <a:tailEnd type="triangle"/>
+          </a:ln>
+        </p:spPr>
+        <p:style>
+          <a:lnRef idx="3">
+            <a:schemeClr val="accent6"/>
+          </a:lnRef>
+          <a:fillRef idx="0">
+            <a:schemeClr val="accent6"/>
+          </a:fillRef>
+          <a:effectRef idx="2">
+            <a:schemeClr val="accent6"/>
+          </a:effectRef>
+          <a:fontRef idx="minor">
+            <a:schemeClr val="tx1"/>
+          </a:fontRef>
+        </p:style>
+      </p:cxnSp>
+      <p:cxnSp>
+        <p:nvCxnSpPr>
+          <p:cNvPr id="117" name="Straight Arrow Connector 116">
+            <a:extLst>
+              <a:ext uri="{FF2B5EF4-FFF2-40B4-BE49-F238E27FC236}">
+                <a16:creationId xmlns:a16="http://schemas.microsoft.com/office/drawing/2014/main" id="{894D65C9-D20C-4A53-B9B0-28E473F59B2A}"/>
+              </a:ext>
+            </a:extLst>
+          </p:cNvPr>
+          <p:cNvCxnSpPr>
+            <a:cxnSpLocks/>
+          </p:cNvCxnSpPr>
+          <p:nvPr/>
+        </p:nvCxnSpPr>
+        <p:spPr>
+          <a:xfrm>
+            <a:off x="6588041" y="1082030"/>
+            <a:ext cx="0" cy="404940"/>
+          </a:xfrm>
+          <a:prstGeom prst="straightConnector1">
+            <a:avLst/>
+          </a:prstGeom>
+          <a:ln w="38100">
+            <a:tailEnd type="triangle"/>
+          </a:ln>
+        </p:spPr>
+        <p:style>
+          <a:lnRef idx="3">
+            <a:schemeClr val="accent6"/>
+          </a:lnRef>
+          <a:fillRef idx="0">
+            <a:schemeClr val="accent6"/>
+          </a:fillRef>
+          <a:effectRef idx="2">
+            <a:schemeClr val="accent6"/>
+          </a:effectRef>
+          <a:fontRef idx="minor">
+            <a:schemeClr val="tx1"/>
+          </a:fontRef>
+        </p:style>
+      </p:cxnSp>
+      <p:cxnSp>
+        <p:nvCxnSpPr>
+          <p:cNvPr id="118" name="Straight Arrow Connector 117">
+            <a:extLst>
+              <a:ext uri="{FF2B5EF4-FFF2-40B4-BE49-F238E27FC236}">
+                <a16:creationId xmlns:a16="http://schemas.microsoft.com/office/drawing/2014/main" id="{DBF8FD7B-B09C-4974-83AE-F21A3FF6FB7B}"/>
+              </a:ext>
+            </a:extLst>
+          </p:cNvPr>
+          <p:cNvCxnSpPr>
+            <a:cxnSpLocks/>
+          </p:cNvCxnSpPr>
+          <p:nvPr/>
+        </p:nvCxnSpPr>
+        <p:spPr>
+          <a:xfrm>
+            <a:off x="6588041" y="1682935"/>
+            <a:ext cx="0" cy="404940"/>
+          </a:xfrm>
+          <a:prstGeom prst="straightConnector1">
+            <a:avLst/>
+          </a:prstGeom>
+          <a:ln w="38100">
+            <a:tailEnd type="triangle"/>
+          </a:ln>
+        </p:spPr>
+        <p:style>
+          <a:lnRef idx="3">
+            <a:schemeClr val="accent6"/>
+          </a:lnRef>
+          <a:fillRef idx="0">
+            <a:schemeClr val="accent6"/>
+          </a:fillRef>
+          <a:effectRef idx="2">
+            <a:schemeClr val="accent6"/>
+          </a:effectRef>
+          <a:fontRef idx="minor">
+            <a:schemeClr val="tx1"/>
+          </a:fontRef>
+        </p:style>
+      </p:cxnSp>
+      <p:cxnSp>
+        <p:nvCxnSpPr>
+          <p:cNvPr id="119" name="Straight Arrow Connector 118">
+            <a:extLst>
+              <a:ext uri="{FF2B5EF4-FFF2-40B4-BE49-F238E27FC236}">
+                <a16:creationId xmlns:a16="http://schemas.microsoft.com/office/drawing/2014/main" id="{A9CA76DA-8D85-424D-918E-1ECCF3921889}"/>
+              </a:ext>
+            </a:extLst>
+          </p:cNvPr>
+          <p:cNvCxnSpPr>
+            <a:cxnSpLocks/>
+          </p:cNvCxnSpPr>
+          <p:nvPr/>
+        </p:nvCxnSpPr>
+        <p:spPr>
+          <a:xfrm>
+            <a:off x="6000212" y="498560"/>
+            <a:ext cx="0" cy="404940"/>
+          </a:xfrm>
+          <a:prstGeom prst="straightConnector1">
+            <a:avLst/>
+          </a:prstGeom>
+          <a:ln w="38100">
+            <a:tailEnd type="triangle"/>
+          </a:ln>
+        </p:spPr>
+        <p:style>
+          <a:lnRef idx="3">
+            <a:schemeClr val="accent6"/>
+          </a:lnRef>
+          <a:fillRef idx="0">
+            <a:schemeClr val="accent6"/>
+          </a:fillRef>
+          <a:effectRef idx="2">
+            <a:schemeClr val="accent6"/>
+          </a:effectRef>
+          <a:fontRef idx="minor">
+            <a:schemeClr val="tx1"/>
+          </a:fontRef>
+        </p:style>
+      </p:cxnSp>
+      <p:cxnSp>
+        <p:nvCxnSpPr>
+          <p:cNvPr id="120" name="Straight Arrow Connector 119">
+            <a:extLst>
+              <a:ext uri="{FF2B5EF4-FFF2-40B4-BE49-F238E27FC236}">
+                <a16:creationId xmlns:a16="http://schemas.microsoft.com/office/drawing/2014/main" id="{7203C228-FCF4-464D-8E0C-B27710AB35F4}"/>
+              </a:ext>
+            </a:extLst>
+          </p:cNvPr>
+          <p:cNvCxnSpPr>
+            <a:cxnSpLocks/>
+          </p:cNvCxnSpPr>
+          <p:nvPr/>
+        </p:nvCxnSpPr>
+        <p:spPr>
+          <a:xfrm>
+            <a:off x="6000212" y="1095089"/>
+            <a:ext cx="0" cy="404940"/>
+          </a:xfrm>
+          <a:prstGeom prst="straightConnector1">
+            <a:avLst/>
+          </a:prstGeom>
+          <a:ln w="38100">
+            <a:tailEnd type="triangle"/>
+          </a:ln>
+        </p:spPr>
+        <p:style>
+          <a:lnRef idx="3">
+            <a:schemeClr val="accent6"/>
+          </a:lnRef>
+          <a:fillRef idx="0">
+            <a:schemeClr val="accent6"/>
+          </a:fillRef>
+          <a:effectRef idx="2">
+            <a:schemeClr val="accent6"/>
+          </a:effectRef>
+          <a:fontRef idx="minor">
+            <a:schemeClr val="tx1"/>
+          </a:fontRef>
+        </p:style>
+      </p:cxnSp>
+      <p:cxnSp>
+        <p:nvCxnSpPr>
+          <p:cNvPr id="121" name="Straight Arrow Connector 120">
+            <a:extLst>
+              <a:ext uri="{FF2B5EF4-FFF2-40B4-BE49-F238E27FC236}">
+                <a16:creationId xmlns:a16="http://schemas.microsoft.com/office/drawing/2014/main" id="{E0973C84-1E50-4D22-872D-CAC6328096ED}"/>
+              </a:ext>
+            </a:extLst>
+          </p:cNvPr>
+          <p:cNvCxnSpPr>
+            <a:cxnSpLocks/>
+          </p:cNvCxnSpPr>
+          <p:nvPr/>
+        </p:nvCxnSpPr>
+        <p:spPr>
+          <a:xfrm>
+            <a:off x="6000212" y="1695994"/>
+            <a:ext cx="0" cy="404940"/>
+          </a:xfrm>
+          <a:prstGeom prst="straightConnector1">
+            <a:avLst/>
+          </a:prstGeom>
+          <a:ln w="38100">
+            <a:tailEnd type="triangle"/>
+          </a:ln>
+        </p:spPr>
+        <p:style>
+          <a:lnRef idx="3">
+            <a:schemeClr val="accent6"/>
+          </a:lnRef>
+          <a:fillRef idx="0">
+            <a:schemeClr val="accent6"/>
+          </a:fillRef>
+          <a:effectRef idx="2">
+            <a:schemeClr val="accent6"/>
+          </a:effectRef>
+          <a:fontRef idx="minor">
+            <a:schemeClr val="tx1"/>
+          </a:fontRef>
+        </p:style>
+      </p:cxnSp>
+      <p:cxnSp>
+        <p:nvCxnSpPr>
+          <p:cNvPr id="122" name="Straight Arrow Connector 121">
+            <a:extLst>
+              <a:ext uri="{FF2B5EF4-FFF2-40B4-BE49-F238E27FC236}">
+                <a16:creationId xmlns:a16="http://schemas.microsoft.com/office/drawing/2014/main" id="{51B52A18-FDC5-4C1A-9196-4F86D1CF61C5}"/>
+              </a:ext>
+            </a:extLst>
+          </p:cNvPr>
+          <p:cNvCxnSpPr>
+            <a:cxnSpLocks/>
+          </p:cNvCxnSpPr>
+          <p:nvPr/>
+        </p:nvCxnSpPr>
+        <p:spPr>
+          <a:xfrm>
+            <a:off x="7785463" y="2296871"/>
+            <a:ext cx="0" cy="404940"/>
+          </a:xfrm>
+          <a:prstGeom prst="straightConnector1">
+            <a:avLst/>
+          </a:prstGeom>
+          <a:ln w="38100">
+            <a:tailEnd type="triangle"/>
+          </a:ln>
+        </p:spPr>
+        <p:style>
+          <a:lnRef idx="3">
+            <a:schemeClr val="accent6"/>
+          </a:lnRef>
+          <a:fillRef idx="0">
+            <a:schemeClr val="accent6"/>
+          </a:fillRef>
+          <a:effectRef idx="2">
+            <a:schemeClr val="accent6"/>
+          </a:effectRef>
+          <a:fontRef idx="minor">
+            <a:schemeClr val="tx1"/>
+          </a:fontRef>
+        </p:style>
+      </p:cxnSp>
+      <p:cxnSp>
+        <p:nvCxnSpPr>
+          <p:cNvPr id="123" name="Straight Arrow Connector 122">
+            <a:extLst>
+              <a:ext uri="{FF2B5EF4-FFF2-40B4-BE49-F238E27FC236}">
+                <a16:creationId xmlns:a16="http://schemas.microsoft.com/office/drawing/2014/main" id="{395DCB22-F2D8-41D2-B5CD-7D14DFAC4954}"/>
+              </a:ext>
+            </a:extLst>
+          </p:cNvPr>
+          <p:cNvCxnSpPr>
+            <a:cxnSpLocks/>
+          </p:cNvCxnSpPr>
+          <p:nvPr/>
+        </p:nvCxnSpPr>
+        <p:spPr>
+          <a:xfrm>
+            <a:off x="7785463" y="2897761"/>
+            <a:ext cx="0" cy="404940"/>
+          </a:xfrm>
+          <a:prstGeom prst="straightConnector1">
+            <a:avLst/>
+          </a:prstGeom>
+          <a:ln w="38100">
+            <a:tailEnd type="triangle"/>
+          </a:ln>
+        </p:spPr>
+        <p:style>
+          <a:lnRef idx="3">
+            <a:schemeClr val="accent6"/>
+          </a:lnRef>
+          <a:fillRef idx="0">
+            <a:schemeClr val="accent6"/>
+          </a:fillRef>
+          <a:effectRef idx="2">
+            <a:schemeClr val="accent6"/>
+          </a:effectRef>
+          <a:fontRef idx="minor">
+            <a:schemeClr val="tx1"/>
+          </a:fontRef>
+        </p:style>
+      </p:cxnSp>
+    </p:spTree>
+    <p:extLst>
+      <p:ext uri="{BB962C8B-B14F-4D97-AF65-F5344CB8AC3E}">
+        <p14:creationId xmlns:p14="http://schemas.microsoft.com/office/powerpoint/2010/main" val="2201503906"/>
+      </p:ext>
+    </p:extLst>
+  </p:cSld>
+  <p:clrMapOvr>
+    <a:masterClrMapping/>
+  </p:clrMapOvr>
+</p:sld>
+</file>
+
+<file path=ppt/slides/slide4.xml><?xml version="1.0" encoding="utf-8"?>
+<p:sld xmlns:a="http://schemas.openxmlformats.org/drawingml/2006/main" xmlns:r="http://schemas.openxmlformats.org/officeDocument/2006/relationships" xmlns:p="http://schemas.openxmlformats.org/presentationml/2006/main">
+  <p:cSld>
+    <p:spTree>
+      <p:nvGrpSpPr>
+        <p:cNvPr id="1" name=""/>
+        <p:cNvGrpSpPr/>
+        <p:nvPr/>
+      </p:nvGrpSpPr>
+      <p:grpSpPr>
+        <a:xfrm>
+          <a:off x="0" y="0"/>
+          <a:ext cx="0" cy="0"/>
+          <a:chOff x="0" y="0"/>
+          <a:chExt cx="0" cy="0"/>
+        </a:xfrm>
+      </p:grpSpPr>
+      <p:sp>
+        <p:nvSpPr>
+          <p:cNvPr id="2" name="Title 1">
+            <a:extLst>
+              <a:ext uri="{FF2B5EF4-FFF2-40B4-BE49-F238E27FC236}">
+                <a16:creationId xmlns:a16="http://schemas.microsoft.com/office/drawing/2014/main" id="{0E7A6F06-5D65-420F-83CA-00887A4616AA}"/>
+              </a:ext>
+            </a:extLst>
+          </p:cNvPr>
+          <p:cNvSpPr>
+            <a:spLocks noGrp="1"/>
+          </p:cNvSpPr>
+          <p:nvPr>
+            <p:ph type="title"/>
+          </p:nvPr>
+        </p:nvSpPr>
+        <p:spPr/>
+        <p:txBody>
+          <a:bodyPr/>
+          <a:lstStyle/>
+          <a:p>
+            <a:endParaRPr lang="en-US"/>
+          </a:p>
+        </p:txBody>
+      </p:sp>
+      <p:sp>
+        <p:nvSpPr>
+          <p:cNvPr id="3" name="Content Placeholder 2">
+            <a:extLst>
+              <a:ext uri="{FF2B5EF4-FFF2-40B4-BE49-F238E27FC236}">
+                <a16:creationId xmlns:a16="http://schemas.microsoft.com/office/drawing/2014/main" id="{F6758175-0543-4218-B47A-670E69CD406D}"/>
+              </a:ext>
+            </a:extLst>
+          </p:cNvPr>
+          <p:cNvSpPr>
+            <a:spLocks noGrp="1"/>
+          </p:cNvSpPr>
+          <p:nvPr>
+            <p:ph idx="1"/>
+          </p:nvPr>
+        </p:nvSpPr>
+        <p:spPr/>
+        <p:txBody>
+          <a:bodyPr/>
+          <a:lstStyle/>
+          <a:p>
+            <a:endParaRPr lang="en-US"/>
+          </a:p>
+        </p:txBody>
+      </p:sp>
+    </p:spTree>
+    <p:extLst>
+      <p:ext uri="{BB962C8B-B14F-4D97-AF65-F5344CB8AC3E}">
+        <p14:creationId xmlns:p14="http://schemas.microsoft.com/office/powerpoint/2010/main" val="665104086"/>
       </p:ext>
     </p:extLst>
   </p:cSld>
@@ -4548,4 +9033,299 @@
     </a:ext>
   </a:extLst>
 </a:theme>
+</file>
+
+<file path=ppt/theme/theme2.xml><?xml version="1.0" encoding="utf-8"?>
+<a:theme xmlns:a="http://schemas.openxmlformats.org/drawingml/2006/main" name="Office Theme">
+  <a:themeElements>
+    <a:clrScheme name="Office">
+      <a:dk1>
+        <a:sysClr val="windowText" lastClr="000000"/>
+      </a:dk1>
+      <a:lt1>
+        <a:sysClr val="window" lastClr="FFFFFF"/>
+      </a:lt1>
+      <a:dk2>
+        <a:srgbClr val="44546A"/>
+      </a:dk2>
+      <a:lt2>
+        <a:srgbClr val="E7E6E6"/>
+      </a:lt2>
+      <a:accent1>
+        <a:srgbClr val="4472C4"/>
+      </a:accent1>
+      <a:accent2>
+        <a:srgbClr val="ED7D31"/>
+      </a:accent2>
+      <a:accent3>
+        <a:srgbClr val="A5A5A5"/>
+      </a:accent3>
+      <a:accent4>
+        <a:srgbClr val="FFC000"/>
+      </a:accent4>
+      <a:accent5>
+        <a:srgbClr val="5B9BD5"/>
+      </a:accent5>
+      <a:accent6>
+        <a:srgbClr val="70AD47"/>
+      </a:accent6>
+      <a:hlink>
+        <a:srgbClr val="0563C1"/>
+      </a:hlink>
+      <a:folHlink>
+        <a:srgbClr val="954F72"/>
+      </a:folHlink>
+    </a:clrScheme>
+    <a:fontScheme name="Office">
+      <a:majorFont>
+        <a:latin typeface="Calibri Light" panose="020F0302020204030204"/>
+        <a:ea typeface=""/>
+        <a:cs typeface=""/>
+        <a:font script="Jpan" typeface="游ゴシック Light"/>
+        <a:font script="Hang" typeface="맑은 고딕"/>
+        <a:font script="Hans" typeface="等线 Light"/>
+        <a:font script="Hant" typeface="新細明體"/>
+        <a:font script="Arab" typeface="Times New Roman"/>
+        <a:font script="Hebr" typeface="Times New Roman"/>
+        <a:font script="Thai" typeface="Angsana New"/>
+        <a:font script="Ethi" typeface="Nyala"/>
+        <a:font script="Beng" typeface="Vrinda"/>
+        <a:font script="Gujr" typeface="Shruti"/>
+        <a:font script="Khmr" typeface="MoolBoran"/>
+        <a:font script="Knda" typeface="Tunga"/>
+        <a:font script="Guru" typeface="Raavi"/>
+        <a:font script="Cans" typeface="Euphemia"/>
+        <a:font script="Cher" typeface="Plantagenet Cherokee"/>
+        <a:font script="Yiii" typeface="Microsoft Yi Baiti"/>
+        <a:font script="Tibt" typeface="Microsoft Himalaya"/>
+        <a:font script="Thaa" typeface="MV Boli"/>
+        <a:font script="Deva" typeface="Mangal"/>
+        <a:font script="Telu" typeface="Gautami"/>
+        <a:font script="Taml" typeface="Latha"/>
+        <a:font script="Syrc" typeface="Estrangelo Edessa"/>
+        <a:font script="Orya" typeface="Kalinga"/>
+        <a:font script="Mlym" typeface="Kartika"/>
+        <a:font script="Laoo" typeface="DokChampa"/>
+        <a:font script="Sinh" typeface="Iskoola Pota"/>
+        <a:font script="Mong" typeface="Mongolian Baiti"/>
+        <a:font script="Viet" typeface="Times New Roman"/>
+        <a:font script="Uigh" typeface="Microsoft Uighur"/>
+        <a:font script="Geor" typeface="Sylfaen"/>
+        <a:font script="Armn" typeface="Arial"/>
+        <a:font script="Bugi" typeface="Leelawadee UI"/>
+        <a:font script="Bopo" typeface="Microsoft JhengHei"/>
+        <a:font script="Java" typeface="Javanese Text"/>
+        <a:font script="Lisu" typeface="Segoe UI"/>
+        <a:font script="Mymr" typeface="Myanmar Text"/>
+        <a:font script="Nkoo" typeface="Ebrima"/>
+        <a:font script="Olck" typeface="Nirmala UI"/>
+        <a:font script="Osma" typeface="Ebrima"/>
+        <a:font script="Phag" typeface="Phagspa"/>
+        <a:font script="Syrn" typeface="Estrangelo Edessa"/>
+        <a:font script="Syrj" typeface="Estrangelo Edessa"/>
+        <a:font script="Syre" typeface="Estrangelo Edessa"/>
+        <a:font script="Sora" typeface="Nirmala UI"/>
+        <a:font script="Tale" typeface="Microsoft Tai Le"/>
+        <a:font script="Talu" typeface="Microsoft New Tai Lue"/>
+        <a:font script="Tfng" typeface="Ebrima"/>
+      </a:majorFont>
+      <a:minorFont>
+        <a:latin typeface="Calibri" panose="020F0502020204030204"/>
+        <a:ea typeface=""/>
+        <a:cs typeface=""/>
+        <a:font script="Jpan" typeface="游ゴシック"/>
+        <a:font script="Hang" typeface="맑은 고딕"/>
+        <a:font script="Hans" typeface="等线"/>
+        <a:font script="Hant" typeface="新細明體"/>
+        <a:font script="Arab" typeface="Arial"/>
+        <a:font script="Hebr" typeface="Arial"/>
+        <a:font script="Thai" typeface="Cordia New"/>
+        <a:font script="Ethi" typeface="Nyala"/>
+        <a:font script="Beng" typeface="Vrinda"/>
+        <a:font script="Gujr" typeface="Shruti"/>
+        <a:font script="Khmr" typeface="DaunPenh"/>
+        <a:font script="Knda" typeface="Tunga"/>
+        <a:font script="Guru" typeface="Raavi"/>
+        <a:font script="Cans" typeface="Euphemia"/>
+        <a:font script="Cher" typeface="Plantagenet Cherokee"/>
+        <a:font script="Yiii" typeface="Microsoft Yi Baiti"/>
+        <a:font script="Tibt" typeface="Microsoft Himalaya"/>
+        <a:font script="Thaa" typeface="MV Boli"/>
+        <a:font script="Deva" typeface="Mangal"/>
+        <a:font script="Telu" typeface="Gautami"/>
+        <a:font script="Taml" typeface="Latha"/>
+        <a:font script="Syrc" typeface="Estrangelo Edessa"/>
+        <a:font script="Orya" typeface="Kalinga"/>
+        <a:font script="Mlym" typeface="Kartika"/>
+        <a:font script="Laoo" typeface="DokChampa"/>
+        <a:font script="Sinh" typeface="Iskoola Pota"/>
+        <a:font script="Mong" typeface="Mongolian Baiti"/>
+        <a:font script="Viet" typeface="Arial"/>
+        <a:font script="Uigh" typeface="Microsoft Uighur"/>
+        <a:font script="Geor" typeface="Sylfaen"/>
+        <a:font script="Armn" typeface="Arial"/>
+        <a:font script="Bugi" typeface="Leelawadee UI"/>
+        <a:font script="Bopo" typeface="Microsoft JhengHei"/>
+        <a:font script="Java" typeface="Javanese Text"/>
+        <a:font script="Lisu" typeface="Segoe UI"/>
+        <a:font script="Mymr" typeface="Myanmar Text"/>
+        <a:font script="Nkoo" typeface="Ebrima"/>
+        <a:font script="Olck" typeface="Nirmala UI"/>
+        <a:font script="Osma" typeface="Ebrima"/>
+        <a:font script="Phag" typeface="Phagspa"/>
+        <a:font script="Syrn" typeface="Estrangelo Edessa"/>
+        <a:font script="Syrj" typeface="Estrangelo Edessa"/>
+        <a:font script="Syre" typeface="Estrangelo Edessa"/>
+        <a:font script="Sora" typeface="Nirmala UI"/>
+        <a:font script="Tale" typeface="Microsoft Tai Le"/>
+        <a:font script="Talu" typeface="Microsoft New Tai Lue"/>
+        <a:font script="Tfng" typeface="Ebrima"/>
+      </a:minorFont>
+    </a:fontScheme>
+    <a:fmtScheme name="Office">
+      <a:fillStyleLst>
+        <a:solidFill>
+          <a:schemeClr val="phClr"/>
+        </a:solidFill>
+        <a:gradFill rotWithShape="1">
+          <a:gsLst>
+            <a:gs pos="0">
+              <a:schemeClr val="phClr">
+                <a:lumMod val="110000"/>
+                <a:satMod val="105000"/>
+                <a:tint val="67000"/>
+              </a:schemeClr>
+            </a:gs>
+            <a:gs pos="50000">
+              <a:schemeClr val="phClr">
+                <a:lumMod val="105000"/>
+                <a:satMod val="103000"/>
+                <a:tint val="73000"/>
+              </a:schemeClr>
+            </a:gs>
+            <a:gs pos="100000">
+              <a:schemeClr val="phClr">
+                <a:lumMod val="105000"/>
+                <a:satMod val="109000"/>
+                <a:tint val="81000"/>
+              </a:schemeClr>
+            </a:gs>
+          </a:gsLst>
+          <a:lin ang="5400000" scaled="0"/>
+        </a:gradFill>
+        <a:gradFill rotWithShape="1">
+          <a:gsLst>
+            <a:gs pos="0">
+              <a:schemeClr val="phClr">
+                <a:satMod val="103000"/>
+                <a:lumMod val="102000"/>
+                <a:tint val="94000"/>
+              </a:schemeClr>
+            </a:gs>
+            <a:gs pos="50000">
+              <a:schemeClr val="phClr">
+                <a:satMod val="110000"/>
+                <a:lumMod val="100000"/>
+                <a:shade val="100000"/>
+              </a:schemeClr>
+            </a:gs>
+            <a:gs pos="100000">
+              <a:schemeClr val="phClr">
+                <a:lumMod val="99000"/>
+                <a:satMod val="120000"/>
+                <a:shade val="78000"/>
+              </a:schemeClr>
+            </a:gs>
+          </a:gsLst>
+          <a:lin ang="5400000" scaled="0"/>
+        </a:gradFill>
+      </a:fillStyleLst>
+      <a:lnStyleLst>
+        <a:ln w="6350" cap="flat" cmpd="sng" algn="ctr">
+          <a:solidFill>
+            <a:schemeClr val="phClr"/>
+          </a:solidFill>
+          <a:prstDash val="solid"/>
+          <a:miter lim="800000"/>
+        </a:ln>
+        <a:ln w="12700" cap="flat" cmpd="sng" algn="ctr">
+          <a:solidFill>
+            <a:schemeClr val="phClr"/>
+          </a:solidFill>
+          <a:prstDash val="solid"/>
+          <a:miter lim="800000"/>
+        </a:ln>
+        <a:ln w="19050" cap="flat" cmpd="sng" algn="ctr">
+          <a:solidFill>
+            <a:schemeClr val="phClr"/>
+          </a:solidFill>
+          <a:prstDash val="solid"/>
+          <a:miter lim="800000"/>
+        </a:ln>
+      </a:lnStyleLst>
+      <a:effectStyleLst>
+        <a:effectStyle>
+          <a:effectLst/>
+        </a:effectStyle>
+        <a:effectStyle>
+          <a:effectLst/>
+        </a:effectStyle>
+        <a:effectStyle>
+          <a:effectLst>
+            <a:outerShdw blurRad="57150" dist="19050" dir="5400000" algn="ctr" rotWithShape="0">
+              <a:srgbClr val="000000">
+                <a:alpha val="63000"/>
+              </a:srgbClr>
+            </a:outerShdw>
+          </a:effectLst>
+        </a:effectStyle>
+      </a:effectStyleLst>
+      <a:bgFillStyleLst>
+        <a:solidFill>
+          <a:schemeClr val="phClr"/>
+        </a:solidFill>
+        <a:solidFill>
+          <a:schemeClr val="phClr">
+            <a:tint val="95000"/>
+            <a:satMod val="170000"/>
+          </a:schemeClr>
+        </a:solidFill>
+        <a:gradFill rotWithShape="1">
+          <a:gsLst>
+            <a:gs pos="0">
+              <a:schemeClr val="phClr">
+                <a:tint val="93000"/>
+                <a:satMod val="150000"/>
+                <a:shade val="98000"/>
+                <a:lumMod val="102000"/>
+              </a:schemeClr>
+            </a:gs>
+            <a:gs pos="50000">
+              <a:schemeClr val="phClr">
+                <a:tint val="98000"/>
+                <a:satMod val="130000"/>
+                <a:shade val="90000"/>
+                <a:lumMod val="103000"/>
+              </a:schemeClr>
+            </a:gs>
+            <a:gs pos="100000">
+              <a:schemeClr val="phClr">
+                <a:shade val="63000"/>
+                <a:satMod val="120000"/>
+              </a:schemeClr>
+            </a:gs>
+          </a:gsLst>
+          <a:lin ang="5400000" scaled="0"/>
+        </a:gradFill>
+      </a:bgFillStyleLst>
+    </a:fmtScheme>
+  </a:themeElements>
+  <a:objectDefaults/>
+  <a:extraClrSchemeLst/>
+  <a:extLst>
+    <a:ext uri="{05A4C25C-085E-4340-85A3-A5531E510DB2}">
+      <thm15:themeFamily xmlns:thm15="http://schemas.microsoft.com/office/thememl/2012/main" name="Office Theme" id="{62F939B6-93AF-4DB8-9C6B-D6C7DFDC589F}" vid="{4A3C46E8-61CC-4603-A589-7422A47A8E4A}"/>
+    </a:ext>
+  </a:extLst>
+</a:theme>
 </file>
</xml_diff>